<commit_message>
feat: atualiza os slides
</commit_message>
<xml_diff>
--- a/slides/Introdução ao Docker.pptx
+++ b/slides/Introdução ao Docker.pptx
@@ -47,30 +47,33 @@
     <p:sldId id="292" r:id="rId42"/>
     <p:sldId id="293" r:id="rId43"/>
     <p:sldId id="294" r:id="rId44"/>
+    <p:sldId id="295" r:id="rId45"/>
+    <p:sldId id="296" r:id="rId46"/>
+    <p:sldId id="297" r:id="rId47"/>
   </p:sldIdLst>
   <p:sldSz cy="5143500" cx="9144000"/>
   <p:notesSz cx="6858000" cy="9144000"/>
   <p:embeddedFontLst>
     <p:embeddedFont>
       <p:font typeface="Montserrat"/>
-      <p:regular r:id="rId45"/>
-      <p:bold r:id="rId46"/>
-      <p:italic r:id="rId47"/>
-      <p:boldItalic r:id="rId48"/>
+      <p:regular r:id="rId48"/>
+      <p:bold r:id="rId49"/>
+      <p:italic r:id="rId50"/>
+      <p:boldItalic r:id="rId51"/>
     </p:embeddedFont>
     <p:embeddedFont>
       <p:font typeface="Lato"/>
-      <p:regular r:id="rId49"/>
-      <p:bold r:id="rId50"/>
-      <p:italic r:id="rId51"/>
-      <p:boldItalic r:id="rId52"/>
+      <p:regular r:id="rId52"/>
+      <p:bold r:id="rId53"/>
+      <p:italic r:id="rId54"/>
+      <p:boldItalic r:id="rId55"/>
     </p:embeddedFont>
     <p:embeddedFont>
       <p:font typeface="Roboto Mono"/>
-      <p:regular r:id="rId53"/>
-      <p:bold r:id="rId54"/>
-      <p:italic r:id="rId55"/>
-      <p:boldItalic r:id="rId56"/>
+      <p:regular r:id="rId56"/>
+      <p:bold r:id="rId57"/>
+      <p:italic r:id="rId58"/>
+      <p:boldItalic r:id="rId59"/>
     </p:embeddedFont>
   </p:embeddedFontLst>
   <p:defaultTextStyle>
@@ -1148,7 +1151,7 @@
   <p:cSld>
     <p:spTree>
       <p:nvGrpSpPr>
-        <p:cNvPr id="272" name="Shape 272"/>
+        <p:cNvPr id="274" name="Shape 274"/>
         <p:cNvGrpSpPr/>
         <p:nvPr/>
       </p:nvGrpSpPr>
@@ -1162,7 +1165,7 @@
       </p:grpSpPr>
       <p:sp>
         <p:nvSpPr>
-          <p:cNvPr id="273" name="Google Shape;273;g385a90f3ca0_0_123:notes"/>
+          <p:cNvPr id="275" name="Google Shape;275;g385a90f3ca0_0_123:notes"/>
           <p:cNvSpPr/>
           <p:nvPr>
             <p:ph idx="2" type="sldImg"/>
@@ -1197,7 +1200,7 @@
       </p:sp>
       <p:sp>
         <p:nvSpPr>
-          <p:cNvPr id="274" name="Google Shape;274;g385a90f3ca0_0_123:notes"/>
+          <p:cNvPr id="276" name="Google Shape;276;g385a90f3ca0_0_123:notes"/>
           <p:cNvSpPr txBox="1"/>
           <p:nvPr>
             <p:ph idx="1" type="body"/>
@@ -1247,7 +1250,7 @@
   <p:cSld>
     <p:spTree>
       <p:nvGrpSpPr>
-        <p:cNvPr id="286" name="Shape 286"/>
+        <p:cNvPr id="288" name="Shape 288"/>
         <p:cNvGrpSpPr/>
         <p:nvPr/>
       </p:nvGrpSpPr>
@@ -1261,7 +1264,7 @@
       </p:grpSpPr>
       <p:sp>
         <p:nvSpPr>
-          <p:cNvPr id="287" name="Google Shape;287;g385a90f3ca0_0_146:notes"/>
+          <p:cNvPr id="289" name="Google Shape;289;g385a90f3ca0_0_146:notes"/>
           <p:cNvSpPr/>
           <p:nvPr>
             <p:ph idx="2" type="sldImg"/>
@@ -1296,7 +1299,7 @@
       </p:sp>
       <p:sp>
         <p:nvSpPr>
-          <p:cNvPr id="288" name="Google Shape;288;g385a90f3ca0_0_146:notes"/>
+          <p:cNvPr id="290" name="Google Shape;290;g385a90f3ca0_0_146:notes"/>
           <p:cNvSpPr txBox="1"/>
           <p:nvPr>
             <p:ph idx="1" type="body"/>
@@ -1346,7 +1349,7 @@
   <p:cSld>
     <p:spTree>
       <p:nvGrpSpPr>
-        <p:cNvPr id="292" name="Shape 292"/>
+        <p:cNvPr id="294" name="Shape 294"/>
         <p:cNvGrpSpPr/>
         <p:nvPr/>
       </p:nvGrpSpPr>
@@ -1360,7 +1363,7 @@
       </p:grpSpPr>
       <p:sp>
         <p:nvSpPr>
-          <p:cNvPr id="293" name="Google Shape;293;g385a90f3ca0_0_152:notes"/>
+          <p:cNvPr id="295" name="Google Shape;295;g385a90f3ca0_0_152:notes"/>
           <p:cNvSpPr/>
           <p:nvPr>
             <p:ph idx="2" type="sldImg"/>
@@ -1395,7 +1398,7 @@
       </p:sp>
       <p:sp>
         <p:nvSpPr>
-          <p:cNvPr id="294" name="Google Shape;294;g385a90f3ca0_0_152:notes"/>
+          <p:cNvPr id="296" name="Google Shape;296;g385a90f3ca0_0_152:notes"/>
           <p:cNvSpPr txBox="1"/>
           <p:nvPr>
             <p:ph idx="1" type="body"/>
@@ -1445,7 +1448,7 @@
   <p:cSld>
     <p:spTree>
       <p:nvGrpSpPr>
-        <p:cNvPr id="304" name="Shape 304"/>
+        <p:cNvPr id="306" name="Shape 306"/>
         <p:cNvGrpSpPr/>
         <p:nvPr/>
       </p:nvGrpSpPr>
@@ -1459,7 +1462,7 @@
       </p:grpSpPr>
       <p:sp>
         <p:nvSpPr>
-          <p:cNvPr id="305" name="Google Shape;305;g385a90f3ca0_0_204:notes"/>
+          <p:cNvPr id="307" name="Google Shape;307;g385a90f3ca0_0_204:notes"/>
           <p:cNvSpPr/>
           <p:nvPr>
             <p:ph idx="2" type="sldImg"/>
@@ -1494,7 +1497,7 @@
       </p:sp>
       <p:sp>
         <p:nvSpPr>
-          <p:cNvPr id="306" name="Google Shape;306;g385a90f3ca0_0_204:notes"/>
+          <p:cNvPr id="308" name="Google Shape;308;g385a90f3ca0_0_204:notes"/>
           <p:cNvSpPr txBox="1"/>
           <p:nvPr>
             <p:ph idx="1" type="body"/>
@@ -1544,7 +1547,7 @@
   <p:cSld>
     <p:spTree>
       <p:nvGrpSpPr>
-        <p:cNvPr id="310" name="Shape 310"/>
+        <p:cNvPr id="312" name="Shape 312"/>
         <p:cNvGrpSpPr/>
         <p:nvPr/>
       </p:nvGrpSpPr>
@@ -1558,7 +1561,7 @@
       </p:grpSpPr>
       <p:sp>
         <p:nvSpPr>
-          <p:cNvPr id="311" name="Google Shape;311;g385a90f3ca0_0_209:notes"/>
+          <p:cNvPr id="313" name="Google Shape;313;g385a90f3ca0_0_209:notes"/>
           <p:cNvSpPr/>
           <p:nvPr>
             <p:ph idx="2" type="sldImg"/>
@@ -1593,7 +1596,7 @@
       </p:sp>
       <p:sp>
         <p:nvSpPr>
-          <p:cNvPr id="312" name="Google Shape;312;g385a90f3ca0_0_209:notes"/>
+          <p:cNvPr id="314" name="Google Shape;314;g385a90f3ca0_0_209:notes"/>
           <p:cNvSpPr txBox="1"/>
           <p:nvPr>
             <p:ph idx="1" type="body"/>
@@ -1643,7 +1646,7 @@
   <p:cSld>
     <p:spTree>
       <p:nvGrpSpPr>
-        <p:cNvPr id="319" name="Shape 319"/>
+        <p:cNvPr id="321" name="Shape 321"/>
         <p:cNvGrpSpPr/>
         <p:nvPr/>
       </p:nvGrpSpPr>
@@ -1657,7 +1660,7 @@
       </p:grpSpPr>
       <p:sp>
         <p:nvSpPr>
-          <p:cNvPr id="320" name="Google Shape;320;g385a90f3ca0_0_220:notes"/>
+          <p:cNvPr id="322" name="Google Shape;322;g385a90f3ca0_0_220:notes"/>
           <p:cNvSpPr/>
           <p:nvPr>
             <p:ph idx="2" type="sldImg"/>
@@ -1692,7 +1695,7 @@
       </p:sp>
       <p:sp>
         <p:nvSpPr>
-          <p:cNvPr id="321" name="Google Shape;321;g385a90f3ca0_0_220:notes"/>
+          <p:cNvPr id="323" name="Google Shape;323;g385a90f3ca0_0_220:notes"/>
           <p:cNvSpPr txBox="1"/>
           <p:nvPr>
             <p:ph idx="1" type="body"/>
@@ -1742,7 +1745,7 @@
   <p:cSld>
     <p:spTree>
       <p:nvGrpSpPr>
-        <p:cNvPr id="325" name="Shape 325"/>
+        <p:cNvPr id="327" name="Shape 327"/>
         <p:cNvGrpSpPr/>
         <p:nvPr/>
       </p:nvGrpSpPr>
@@ -1756,7 +1759,7 @@
       </p:grpSpPr>
       <p:sp>
         <p:nvSpPr>
-          <p:cNvPr id="326" name="Google Shape;326;g38adb88458c_0_0:notes"/>
+          <p:cNvPr id="328" name="Google Shape;328;g38adb88458c_0_0:notes"/>
           <p:cNvSpPr/>
           <p:nvPr>
             <p:ph idx="2" type="sldImg"/>
@@ -1791,7 +1794,7 @@
       </p:sp>
       <p:sp>
         <p:nvSpPr>
-          <p:cNvPr id="327" name="Google Shape;327;g38adb88458c_0_0:notes"/>
+          <p:cNvPr id="329" name="Google Shape;329;g38adb88458c_0_0:notes"/>
           <p:cNvSpPr txBox="1"/>
           <p:nvPr>
             <p:ph idx="1" type="body"/>
@@ -1940,7 +1943,7 @@
   <p:cSld>
     <p:spTree>
       <p:nvGrpSpPr>
-        <p:cNvPr id="332" name="Shape 332"/>
+        <p:cNvPr id="334" name="Shape 334"/>
         <p:cNvGrpSpPr/>
         <p:nvPr/>
       </p:nvGrpSpPr>
@@ -1954,7 +1957,7 @@
       </p:grpSpPr>
       <p:sp>
         <p:nvSpPr>
-          <p:cNvPr id="333" name="Google Shape;333;g38adb88458c_0_55:notes"/>
+          <p:cNvPr id="335" name="Google Shape;335;g38adb88458c_0_55:notes"/>
           <p:cNvSpPr/>
           <p:nvPr>
             <p:ph idx="2" type="sldImg"/>
@@ -1989,7 +1992,7 @@
       </p:sp>
       <p:sp>
         <p:nvSpPr>
-          <p:cNvPr id="334" name="Google Shape;334;g38adb88458c_0_55:notes"/>
+          <p:cNvPr id="336" name="Google Shape;336;g38adb88458c_0_55:notes"/>
           <p:cNvSpPr txBox="1"/>
           <p:nvPr>
             <p:ph idx="1" type="body"/>
@@ -2039,7 +2042,7 @@
   <p:cSld>
     <p:spTree>
       <p:nvGrpSpPr>
-        <p:cNvPr id="337" name="Shape 337"/>
+        <p:cNvPr id="339" name="Shape 339"/>
         <p:cNvGrpSpPr/>
         <p:nvPr/>
       </p:nvGrpSpPr>
@@ -2053,7 +2056,7 @@
       </p:grpSpPr>
       <p:sp>
         <p:nvSpPr>
-          <p:cNvPr id="338" name="Google Shape;338;g38adb88458c_0_6:notes"/>
+          <p:cNvPr id="340" name="Google Shape;340;g38adb88458c_0_6:notes"/>
           <p:cNvSpPr/>
           <p:nvPr>
             <p:ph idx="2" type="sldImg"/>
@@ -2088,7 +2091,7 @@
       </p:sp>
       <p:sp>
         <p:nvSpPr>
-          <p:cNvPr id="339" name="Google Shape;339;g38adb88458c_0_6:notes"/>
+          <p:cNvPr id="341" name="Google Shape;341;g38adb88458c_0_6:notes"/>
           <p:cNvSpPr txBox="1"/>
           <p:nvPr>
             <p:ph idx="1" type="body"/>
@@ -2138,7 +2141,7 @@
   <p:cSld>
     <p:spTree>
       <p:nvGrpSpPr>
-        <p:cNvPr id="343" name="Shape 343"/>
+        <p:cNvPr id="345" name="Shape 345"/>
         <p:cNvGrpSpPr/>
         <p:nvPr/>
       </p:nvGrpSpPr>
@@ -2152,7 +2155,7 @@
       </p:grpSpPr>
       <p:sp>
         <p:nvSpPr>
-          <p:cNvPr id="344" name="Google Shape;344;g38adb88458c_0_14:notes"/>
+          <p:cNvPr id="346" name="Google Shape;346;g38d688177a7_0_6:notes"/>
           <p:cNvSpPr/>
           <p:nvPr>
             <p:ph idx="2" type="sldImg"/>
@@ -2187,7 +2190,7 @@
       </p:sp>
       <p:sp>
         <p:nvSpPr>
-          <p:cNvPr id="345" name="Google Shape;345;g38adb88458c_0_14:notes"/>
+          <p:cNvPr id="347" name="Google Shape;347;g38d688177a7_0_6:notes"/>
           <p:cNvSpPr txBox="1"/>
           <p:nvPr>
             <p:ph idx="1" type="body"/>
@@ -2237,7 +2240,7 @@
   <p:cSld>
     <p:spTree>
       <p:nvGrpSpPr>
-        <p:cNvPr id="349" name="Shape 349"/>
+        <p:cNvPr id="351" name="Shape 351"/>
         <p:cNvGrpSpPr/>
         <p:nvPr/>
       </p:nvGrpSpPr>
@@ -2251,7 +2254,7 @@
       </p:grpSpPr>
       <p:sp>
         <p:nvSpPr>
-          <p:cNvPr id="350" name="Google Shape;350;g38adb88458c_0_19:notes"/>
+          <p:cNvPr id="352" name="Google Shape;352;g38d688177a7_0_0:notes"/>
           <p:cNvSpPr/>
           <p:nvPr>
             <p:ph idx="2" type="sldImg"/>
@@ -2286,7 +2289,7 @@
       </p:sp>
       <p:sp>
         <p:nvSpPr>
-          <p:cNvPr id="351" name="Google Shape;351;g38adb88458c_0_19:notes"/>
+          <p:cNvPr id="353" name="Google Shape;353;g38d688177a7_0_0:notes"/>
           <p:cNvSpPr txBox="1"/>
           <p:nvPr>
             <p:ph idx="1" type="body"/>
@@ -2336,7 +2339,7 @@
   <p:cSld>
     <p:spTree>
       <p:nvGrpSpPr>
-        <p:cNvPr id="355" name="Shape 355"/>
+        <p:cNvPr id="356" name="Shape 356"/>
         <p:cNvGrpSpPr/>
         <p:nvPr/>
       </p:nvGrpSpPr>
@@ -2350,7 +2353,7 @@
       </p:grpSpPr>
       <p:sp>
         <p:nvSpPr>
-          <p:cNvPr id="356" name="Google Shape;356;g38adb88458c_0_24:notes"/>
+          <p:cNvPr id="357" name="Google Shape;357;g38adb88458c_0_14:notes"/>
           <p:cNvSpPr/>
           <p:nvPr>
             <p:ph idx="2" type="sldImg"/>
@@ -2385,7 +2388,7 @@
       </p:sp>
       <p:sp>
         <p:nvSpPr>
-          <p:cNvPr id="357" name="Google Shape;357;g38adb88458c_0_24:notes"/>
+          <p:cNvPr id="358" name="Google Shape;358;g38adb88458c_0_14:notes"/>
           <p:cNvSpPr txBox="1"/>
           <p:nvPr>
             <p:ph idx="1" type="body"/>
@@ -2435,7 +2438,7 @@
   <p:cSld>
     <p:spTree>
       <p:nvGrpSpPr>
-        <p:cNvPr id="361" name="Shape 361"/>
+        <p:cNvPr id="363" name="Shape 363"/>
         <p:cNvGrpSpPr/>
         <p:nvPr/>
       </p:nvGrpSpPr>
@@ -2449,7 +2452,7 @@
       </p:grpSpPr>
       <p:sp>
         <p:nvSpPr>
-          <p:cNvPr id="362" name="Google Shape;362;g38adb88458c_0_39:notes"/>
+          <p:cNvPr id="364" name="Google Shape;364;g38adb88458c_0_19:notes"/>
           <p:cNvSpPr/>
           <p:nvPr>
             <p:ph idx="2" type="sldImg"/>
@@ -2484,7 +2487,7 @@
       </p:sp>
       <p:sp>
         <p:nvSpPr>
-          <p:cNvPr id="363" name="Google Shape;363;g38adb88458c_0_39:notes"/>
+          <p:cNvPr id="365" name="Google Shape;365;g38adb88458c_0_19:notes"/>
           <p:cNvSpPr txBox="1"/>
           <p:nvPr>
             <p:ph idx="1" type="body"/>
@@ -2534,7 +2537,7 @@
   <p:cSld>
     <p:spTree>
       <p:nvGrpSpPr>
-        <p:cNvPr id="367" name="Shape 367"/>
+        <p:cNvPr id="370" name="Shape 370"/>
         <p:cNvGrpSpPr/>
         <p:nvPr/>
       </p:nvGrpSpPr>
@@ -2548,7 +2551,7 @@
       </p:grpSpPr>
       <p:sp>
         <p:nvSpPr>
-          <p:cNvPr id="368" name="Google Shape;368;g385e776578a_0_2:notes"/>
+          <p:cNvPr id="371" name="Google Shape;371;g38adb88458c_0_24:notes"/>
           <p:cNvSpPr/>
           <p:nvPr>
             <p:ph idx="2" type="sldImg"/>
@@ -2583,7 +2586,7 @@
       </p:sp>
       <p:sp>
         <p:nvSpPr>
-          <p:cNvPr id="369" name="Google Shape;369;g385e776578a_0_2:notes"/>
+          <p:cNvPr id="372" name="Google Shape;372;g38adb88458c_0_24:notes"/>
           <p:cNvSpPr txBox="1"/>
           <p:nvPr>
             <p:ph idx="1" type="body"/>
@@ -2633,7 +2636,7 @@
   <p:cSld>
     <p:spTree>
       <p:nvGrpSpPr>
-        <p:cNvPr id="373" name="Shape 373"/>
+        <p:cNvPr id="377" name="Shape 377"/>
         <p:cNvGrpSpPr/>
         <p:nvPr/>
       </p:nvGrpSpPr>
@@ -2647,7 +2650,7 @@
       </p:grpSpPr>
       <p:sp>
         <p:nvSpPr>
-          <p:cNvPr id="374" name="Google Shape;374;g38adb88458c_0_29:notes"/>
+          <p:cNvPr id="378" name="Google Shape;378;g38d688177a7_0_21:notes"/>
           <p:cNvSpPr/>
           <p:nvPr>
             <p:ph idx="2" type="sldImg"/>
@@ -2682,7 +2685,7 @@
       </p:sp>
       <p:sp>
         <p:nvSpPr>
-          <p:cNvPr id="375" name="Google Shape;375;g38adb88458c_0_29:notes"/>
+          <p:cNvPr id="379" name="Google Shape;379;g38d688177a7_0_21:notes"/>
           <p:cNvSpPr txBox="1"/>
           <p:nvPr>
             <p:ph idx="1" type="body"/>
@@ -2732,7 +2735,7 @@
   <p:cSld>
     <p:spTree>
       <p:nvGrpSpPr>
-        <p:cNvPr id="379" name="Shape 379"/>
+        <p:cNvPr id="384" name="Shape 384"/>
         <p:cNvGrpSpPr/>
         <p:nvPr/>
       </p:nvGrpSpPr>
@@ -2746,7 +2749,7 @@
       </p:grpSpPr>
       <p:sp>
         <p:nvSpPr>
-          <p:cNvPr id="380" name="Google Shape;380;g385e48c137e_0_0:notes"/>
+          <p:cNvPr id="385" name="Google Shape;385;g38d688177a7_0_32:notes"/>
           <p:cNvSpPr/>
           <p:nvPr>
             <p:ph idx="2" type="sldImg"/>
@@ -2781,7 +2784,7 @@
       </p:sp>
       <p:sp>
         <p:nvSpPr>
-          <p:cNvPr id="381" name="Google Shape;381;g385e48c137e_0_0:notes"/>
+          <p:cNvPr id="386" name="Google Shape;386;g38d688177a7_0_32:notes"/>
           <p:cNvSpPr txBox="1"/>
           <p:nvPr>
             <p:ph idx="1" type="body"/>
@@ -2831,7 +2834,7 @@
   <p:cSld>
     <p:spTree>
       <p:nvGrpSpPr>
-        <p:cNvPr id="385" name="Shape 385"/>
+        <p:cNvPr id="390" name="Shape 390"/>
         <p:cNvGrpSpPr/>
         <p:nvPr/>
       </p:nvGrpSpPr>
@@ -2845,7 +2848,7 @@
       </p:grpSpPr>
       <p:sp>
         <p:nvSpPr>
-          <p:cNvPr id="386" name="Google Shape;386;g38adb88458c_0_45:notes"/>
+          <p:cNvPr id="391" name="Google Shape;391;g385e776578a_0_2:notes"/>
           <p:cNvSpPr/>
           <p:nvPr>
             <p:ph idx="2" type="sldImg"/>
@@ -2880,7 +2883,7 @@
       </p:sp>
       <p:sp>
         <p:nvSpPr>
-          <p:cNvPr id="387" name="Google Shape;387;g38adb88458c_0_45:notes"/>
+          <p:cNvPr id="392" name="Google Shape;392;g385e776578a_0_2:notes"/>
           <p:cNvSpPr txBox="1"/>
           <p:nvPr>
             <p:ph idx="1" type="body"/>
@@ -3029,7 +3032,7 @@
   <p:cSld>
     <p:spTree>
       <p:nvGrpSpPr>
-        <p:cNvPr id="390" name="Shape 390"/>
+        <p:cNvPr id="397" name="Shape 397"/>
         <p:cNvGrpSpPr/>
         <p:nvPr/>
       </p:nvGrpSpPr>
@@ -3043,7 +3046,7 @@
       </p:grpSpPr>
       <p:sp>
         <p:nvSpPr>
-          <p:cNvPr id="391" name="Google Shape;391;g385e48c137e_0_20:notes"/>
+          <p:cNvPr id="398" name="Google Shape;398;g38adb88458c_0_29:notes"/>
           <p:cNvSpPr/>
           <p:nvPr>
             <p:ph idx="2" type="sldImg"/>
@@ -3078,7 +3081,7 @@
       </p:sp>
       <p:sp>
         <p:nvSpPr>
-          <p:cNvPr id="392" name="Google Shape;392;g385e48c137e_0_20:notes"/>
+          <p:cNvPr id="399" name="Google Shape;399;g38adb88458c_0_29:notes"/>
           <p:cNvSpPr txBox="1"/>
           <p:nvPr>
             <p:ph idx="1" type="body"/>
@@ -3128,7 +3131,7 @@
   <p:cSld>
     <p:spTree>
       <p:nvGrpSpPr>
-        <p:cNvPr id="397" name="Shape 397"/>
+        <p:cNvPr id="404" name="Shape 404"/>
         <p:cNvGrpSpPr/>
         <p:nvPr/>
       </p:nvGrpSpPr>
@@ -3142,7 +3145,7 @@
       </p:grpSpPr>
       <p:sp>
         <p:nvSpPr>
-          <p:cNvPr id="398" name="Google Shape;398;g385e48c137e_0_37:notes"/>
+          <p:cNvPr id="405" name="Google Shape;405;g385e48c137e_0_0:notes"/>
           <p:cNvSpPr/>
           <p:nvPr>
             <p:ph idx="2" type="sldImg"/>
@@ -3177,7 +3180,7 @@
       </p:sp>
       <p:sp>
         <p:nvSpPr>
-          <p:cNvPr id="399" name="Google Shape;399;g385e48c137e_0_37:notes"/>
+          <p:cNvPr id="406" name="Google Shape;406;g385e48c137e_0_0:notes"/>
           <p:cNvSpPr txBox="1"/>
           <p:nvPr>
             <p:ph idx="1" type="body"/>
@@ -3227,7 +3230,7 @@
   <p:cSld>
     <p:spTree>
       <p:nvGrpSpPr>
-        <p:cNvPr id="403" name="Shape 403"/>
+        <p:cNvPr id="411" name="Shape 411"/>
         <p:cNvGrpSpPr/>
         <p:nvPr/>
       </p:nvGrpSpPr>
@@ -3241,7 +3244,7 @@
       </p:grpSpPr>
       <p:sp>
         <p:nvSpPr>
-          <p:cNvPr id="404" name="Google Shape;404;g385e48c137e_0_49:notes"/>
+          <p:cNvPr id="412" name="Google Shape;412;g38adb88458c_0_45:notes"/>
           <p:cNvSpPr/>
           <p:nvPr>
             <p:ph idx="2" type="sldImg"/>
@@ -3276,7 +3279,7 @@
       </p:sp>
       <p:sp>
         <p:nvSpPr>
-          <p:cNvPr id="405" name="Google Shape;405;g385e48c137e_0_49:notes"/>
+          <p:cNvPr id="413" name="Google Shape;413;g38adb88458c_0_45:notes"/>
           <p:cNvSpPr txBox="1"/>
           <p:nvPr>
             <p:ph idx="1" type="body"/>
@@ -3326,7 +3329,7 @@
   <p:cSld>
     <p:spTree>
       <p:nvGrpSpPr>
-        <p:cNvPr id="409" name="Shape 409"/>
+        <p:cNvPr id="416" name="Shape 416"/>
         <p:cNvGrpSpPr/>
         <p:nvPr/>
       </p:nvGrpSpPr>
@@ -3340,7 +3343,7 @@
       </p:grpSpPr>
       <p:sp>
         <p:nvSpPr>
-          <p:cNvPr id="410" name="Google Shape;410;g385e48c137e_0_55:notes"/>
+          <p:cNvPr id="417" name="Google Shape;417;g385e48c137e_0_20:notes"/>
           <p:cNvSpPr/>
           <p:nvPr>
             <p:ph idx="2" type="sldImg"/>
@@ -3375,7 +3378,7 @@
       </p:sp>
       <p:sp>
         <p:nvSpPr>
-          <p:cNvPr id="411" name="Google Shape;411;g385e48c137e_0_55:notes"/>
+          <p:cNvPr id="418" name="Google Shape;418;g385e48c137e_0_20:notes"/>
           <p:cNvSpPr txBox="1"/>
           <p:nvPr>
             <p:ph idx="1" type="body"/>
@@ -3425,7 +3428,7 @@
   <p:cSld>
     <p:spTree>
       <p:nvGrpSpPr>
-        <p:cNvPr id="416" name="Shape 416"/>
+        <p:cNvPr id="423" name="Shape 423"/>
         <p:cNvGrpSpPr/>
         <p:nvPr/>
       </p:nvGrpSpPr>
@@ -3439,7 +3442,7 @@
       </p:grpSpPr>
       <p:sp>
         <p:nvSpPr>
-          <p:cNvPr id="417" name="Google Shape;417;g385e776578a_0_9:notes"/>
+          <p:cNvPr id="424" name="Google Shape;424;g385e48c137e_0_37:notes"/>
           <p:cNvSpPr/>
           <p:nvPr>
             <p:ph idx="2" type="sldImg"/>
@@ -3474,7 +3477,7 @@
       </p:sp>
       <p:sp>
         <p:nvSpPr>
-          <p:cNvPr id="418" name="Google Shape;418;g385e776578a_0_9:notes"/>
+          <p:cNvPr id="425" name="Google Shape;425;g385e48c137e_0_37:notes"/>
           <p:cNvSpPr txBox="1"/>
           <p:nvPr>
             <p:ph idx="1" type="body"/>
@@ -3524,7 +3527,7 @@
   <p:cSld>
     <p:spTree>
       <p:nvGrpSpPr>
-        <p:cNvPr id="421" name="Shape 421"/>
+        <p:cNvPr id="429" name="Shape 429"/>
         <p:cNvGrpSpPr/>
         <p:nvPr/>
       </p:nvGrpSpPr>
@@ -3538,7 +3541,7 @@
       </p:grpSpPr>
       <p:sp>
         <p:nvSpPr>
-          <p:cNvPr id="422" name="Google Shape;422;g385e776578a_0_21:notes"/>
+          <p:cNvPr id="430" name="Google Shape;430;g385e48c137e_0_49:notes"/>
           <p:cNvSpPr/>
           <p:nvPr>
             <p:ph idx="2" type="sldImg"/>
@@ -3573,7 +3576,7 @@
       </p:sp>
       <p:sp>
         <p:nvSpPr>
-          <p:cNvPr id="423" name="Google Shape;423;g385e776578a_0_21:notes"/>
+          <p:cNvPr id="431" name="Google Shape;431;g385e48c137e_0_49:notes"/>
           <p:cNvSpPr txBox="1"/>
           <p:nvPr>
             <p:ph idx="1" type="body"/>
@@ -3623,7 +3626,7 @@
   <p:cSld>
     <p:spTree>
       <p:nvGrpSpPr>
-        <p:cNvPr id="427" name="Shape 427"/>
+        <p:cNvPr id="437" name="Shape 437"/>
         <p:cNvGrpSpPr/>
         <p:nvPr/>
       </p:nvGrpSpPr>
@@ -3637,7 +3640,7 @@
       </p:grpSpPr>
       <p:sp>
         <p:nvSpPr>
-          <p:cNvPr id="428" name="Google Shape;428;g385e776578a_0_26:notes"/>
+          <p:cNvPr id="438" name="Google Shape;438;g385e48c137e_0_55:notes"/>
           <p:cNvSpPr/>
           <p:nvPr>
             <p:ph idx="2" type="sldImg"/>
@@ -3672,7 +3675,7 @@
       </p:sp>
       <p:sp>
         <p:nvSpPr>
-          <p:cNvPr id="429" name="Google Shape;429;g385e776578a_0_26:notes"/>
+          <p:cNvPr id="439" name="Google Shape;439;g385e48c137e_0_55:notes"/>
           <p:cNvSpPr txBox="1"/>
           <p:nvPr>
             <p:ph idx="1" type="body"/>
@@ -3722,7 +3725,7 @@
   <p:cSld>
     <p:spTree>
       <p:nvGrpSpPr>
-        <p:cNvPr id="433" name="Shape 433"/>
+        <p:cNvPr id="444" name="Shape 444"/>
         <p:cNvGrpSpPr/>
         <p:nvPr/>
       </p:nvGrpSpPr>
@@ -3736,7 +3739,7 @@
       </p:grpSpPr>
       <p:sp>
         <p:nvSpPr>
-          <p:cNvPr id="434" name="Google Shape;434;g385e776578a_0_37:notes"/>
+          <p:cNvPr id="445" name="Google Shape;445;g385e776578a_0_9:notes"/>
           <p:cNvSpPr/>
           <p:nvPr>
             <p:ph idx="2" type="sldImg"/>
@@ -3771,7 +3774,7 @@
       </p:sp>
       <p:sp>
         <p:nvSpPr>
-          <p:cNvPr id="435" name="Google Shape;435;g385e776578a_0_37:notes"/>
+          <p:cNvPr id="446" name="Google Shape;446;g385e776578a_0_9:notes"/>
           <p:cNvSpPr txBox="1"/>
           <p:nvPr>
             <p:ph idx="1" type="body"/>
@@ -3821,7 +3824,7 @@
   <p:cSld>
     <p:spTree>
       <p:nvGrpSpPr>
-        <p:cNvPr id="439" name="Shape 439"/>
+        <p:cNvPr id="449" name="Shape 449"/>
         <p:cNvGrpSpPr/>
         <p:nvPr/>
       </p:nvGrpSpPr>
@@ -3835,7 +3838,7 @@
       </p:grpSpPr>
       <p:sp>
         <p:nvSpPr>
-          <p:cNvPr id="440" name="Google Shape;440;g385e776578a_0_49:notes"/>
+          <p:cNvPr id="450" name="Google Shape;450;g385e776578a_0_21:notes"/>
           <p:cNvSpPr/>
           <p:nvPr>
             <p:ph idx="2" type="sldImg"/>
@@ -3870,7 +3873,7 @@
       </p:sp>
       <p:sp>
         <p:nvSpPr>
-          <p:cNvPr id="441" name="Google Shape;441;g385e776578a_0_49:notes"/>
+          <p:cNvPr id="451" name="Google Shape;451;g385e776578a_0_21:notes"/>
           <p:cNvSpPr txBox="1"/>
           <p:nvPr>
             <p:ph idx="1" type="body"/>
@@ -3920,7 +3923,7 @@
   <p:cSld>
     <p:spTree>
       <p:nvGrpSpPr>
-        <p:cNvPr id="445" name="Shape 445"/>
+        <p:cNvPr id="455" name="Shape 455"/>
         <p:cNvGrpSpPr/>
         <p:nvPr/>
       </p:nvGrpSpPr>
@@ -3934,7 +3937,7 @@
       </p:grpSpPr>
       <p:sp>
         <p:nvSpPr>
-          <p:cNvPr id="446" name="Google Shape;446;g385e776578a_0_43:notes"/>
+          <p:cNvPr id="456" name="Google Shape;456;g385e776578a_0_26:notes"/>
           <p:cNvSpPr/>
           <p:nvPr>
             <p:ph idx="2" type="sldImg"/>
@@ -3969,7 +3972,7 @@
       </p:sp>
       <p:sp>
         <p:nvSpPr>
-          <p:cNvPr id="447" name="Google Shape;447;g385e776578a_0_43:notes"/>
+          <p:cNvPr id="457" name="Google Shape;457;g385e776578a_0_26:notes"/>
           <p:cNvSpPr txBox="1"/>
           <p:nvPr>
             <p:ph idx="1" type="body"/>
@@ -4069,6 +4072,303 @@
       <p:sp>
         <p:nvSpPr>
           <p:cNvPr id="149" name="Google Shape;149;g385a90f3ca0_0_5:notes"/>
+          <p:cNvSpPr txBox="1"/>
+          <p:nvPr>
+            <p:ph idx="1" type="body"/>
+          </p:nvPr>
+        </p:nvSpPr>
+        <p:spPr>
+          <a:xfrm>
+            <a:off x="685800" y="4343400"/>
+            <a:ext cx="5486400" cy="4114800"/>
+          </a:xfrm>
+          <a:prstGeom prst="rect">
+            <a:avLst/>
+          </a:prstGeom>
+        </p:spPr>
+        <p:txBody>
+          <a:bodyPr anchorCtr="0" anchor="t" bIns="91425" lIns="91425" spcFirstLastPara="1" rIns="91425" wrap="square" tIns="91425">
+            <a:noAutofit/>
+          </a:bodyPr>
+          <a:lstStyle/>
+          <a:p>
+            <a:pPr indent="0" lvl="0" marL="0" rtl="0" algn="l">
+              <a:spcBef>
+                <a:spcPts val="0"/>
+              </a:spcBef>
+              <a:spcAft>
+                <a:spcPts val="0"/>
+              </a:spcAft>
+              <a:buNone/>
+            </a:pPr>
+            <a:r>
+              <a:t/>
+            </a:r>
+            <a:endParaRPr/>
+          </a:p>
+        </p:txBody>
+      </p:sp>
+    </p:spTree>
+  </p:cSld>
+  <p:clrMapOvr>
+    <a:masterClrMapping/>
+  </p:clrMapOvr>
+</p:notes>
+</file>
+
+<file path=ppt/notesSlides/notesSlide40.xml><?xml version="1.0" encoding="utf-8"?>
+<p:notes xmlns:a="http://schemas.openxmlformats.org/drawingml/2006/main" xmlns:r="http://schemas.openxmlformats.org/officeDocument/2006/relationships" xmlns:mc="http://schemas.openxmlformats.org/markup-compatibility/2006" xmlns:mv="urn:schemas-microsoft-com:mac:vml" xmlns:p="http://schemas.openxmlformats.org/presentationml/2006/main" xmlns:c="http://schemas.openxmlformats.org/drawingml/2006/chart" xmlns:dgm="http://schemas.openxmlformats.org/drawingml/2006/diagram" xmlns:o="urn:schemas-microsoft-com:office:office" xmlns:v="urn:schemas-microsoft-com:vml" xmlns:pvml="urn:schemas-microsoft-com:office:powerpoint" xmlns:com="http://schemas.openxmlformats.org/drawingml/2006/compatibility" xmlns:p14="http://schemas.microsoft.com/office/powerpoint/2010/main" xmlns:p15="http://schemas.microsoft.com/office/powerpoint/2012/main" xmlns:ahyp="http://schemas.microsoft.com/office/drawing/2018/hyperlinkcolor" showMasterPhAnim="0" showMasterSp="0">
+  <p:cSld>
+    <p:spTree>
+      <p:nvGrpSpPr>
+        <p:cNvPr id="461" name="Shape 461"/>
+        <p:cNvGrpSpPr/>
+        <p:nvPr/>
+      </p:nvGrpSpPr>
+      <p:grpSpPr>
+        <a:xfrm>
+          <a:off x="0" y="0"/>
+          <a:ext cx="0" cy="0"/>
+          <a:chOff x="0" y="0"/>
+          <a:chExt cx="0" cy="0"/>
+        </a:xfrm>
+      </p:grpSpPr>
+      <p:sp>
+        <p:nvSpPr>
+          <p:cNvPr id="462" name="Google Shape;462;g385e776578a_0_37:notes"/>
+          <p:cNvSpPr/>
+          <p:nvPr>
+            <p:ph idx="2" type="sldImg"/>
+          </p:nvPr>
+        </p:nvSpPr>
+        <p:spPr>
+          <a:xfrm>
+            <a:off x="381300" y="685800"/>
+            <a:ext cx="6096000" cy="3429000"/>
+          </a:xfrm>
+          <a:custGeom>
+            <a:rect b="b" l="l" r="r" t="t"/>
+            <a:pathLst>
+              <a:path extrusionOk="0" h="120000" w="120000">
+                <a:moveTo>
+                  <a:pt x="0" y="0"/>
+                </a:moveTo>
+                <a:lnTo>
+                  <a:pt x="120000" y="0"/>
+                </a:lnTo>
+                <a:lnTo>
+                  <a:pt x="120000" y="120000"/>
+                </a:lnTo>
+                <a:lnTo>
+                  <a:pt x="0" y="120000"/>
+                </a:lnTo>
+                <a:close/>
+              </a:path>
+            </a:pathLst>
+          </a:custGeom>
+        </p:spPr>
+      </p:sp>
+      <p:sp>
+        <p:nvSpPr>
+          <p:cNvPr id="463" name="Google Shape;463;g385e776578a_0_37:notes"/>
+          <p:cNvSpPr txBox="1"/>
+          <p:nvPr>
+            <p:ph idx="1" type="body"/>
+          </p:nvPr>
+        </p:nvSpPr>
+        <p:spPr>
+          <a:xfrm>
+            <a:off x="685800" y="4343400"/>
+            <a:ext cx="5486400" cy="4114800"/>
+          </a:xfrm>
+          <a:prstGeom prst="rect">
+            <a:avLst/>
+          </a:prstGeom>
+        </p:spPr>
+        <p:txBody>
+          <a:bodyPr anchorCtr="0" anchor="t" bIns="91425" lIns="91425" spcFirstLastPara="1" rIns="91425" wrap="square" tIns="91425">
+            <a:noAutofit/>
+          </a:bodyPr>
+          <a:lstStyle/>
+          <a:p>
+            <a:pPr indent="0" lvl="0" marL="0" rtl="0" algn="l">
+              <a:spcBef>
+                <a:spcPts val="0"/>
+              </a:spcBef>
+              <a:spcAft>
+                <a:spcPts val="0"/>
+              </a:spcAft>
+              <a:buNone/>
+            </a:pPr>
+            <a:r>
+              <a:t/>
+            </a:r>
+            <a:endParaRPr/>
+          </a:p>
+        </p:txBody>
+      </p:sp>
+    </p:spTree>
+  </p:cSld>
+  <p:clrMapOvr>
+    <a:masterClrMapping/>
+  </p:clrMapOvr>
+</p:notes>
+</file>
+
+<file path=ppt/notesSlides/notesSlide41.xml><?xml version="1.0" encoding="utf-8"?>
+<p:notes xmlns:a="http://schemas.openxmlformats.org/drawingml/2006/main" xmlns:r="http://schemas.openxmlformats.org/officeDocument/2006/relationships" xmlns:mc="http://schemas.openxmlformats.org/markup-compatibility/2006" xmlns:mv="urn:schemas-microsoft-com:mac:vml" xmlns:p="http://schemas.openxmlformats.org/presentationml/2006/main" xmlns:c="http://schemas.openxmlformats.org/drawingml/2006/chart" xmlns:dgm="http://schemas.openxmlformats.org/drawingml/2006/diagram" xmlns:o="urn:schemas-microsoft-com:office:office" xmlns:v="urn:schemas-microsoft-com:vml" xmlns:pvml="urn:schemas-microsoft-com:office:powerpoint" xmlns:com="http://schemas.openxmlformats.org/drawingml/2006/compatibility" xmlns:p14="http://schemas.microsoft.com/office/powerpoint/2010/main" xmlns:p15="http://schemas.microsoft.com/office/powerpoint/2012/main" xmlns:ahyp="http://schemas.microsoft.com/office/drawing/2018/hyperlinkcolor" showMasterPhAnim="0" showMasterSp="0">
+  <p:cSld>
+    <p:spTree>
+      <p:nvGrpSpPr>
+        <p:cNvPr id="467" name="Shape 467"/>
+        <p:cNvGrpSpPr/>
+        <p:nvPr/>
+      </p:nvGrpSpPr>
+      <p:grpSpPr>
+        <a:xfrm>
+          <a:off x="0" y="0"/>
+          <a:ext cx="0" cy="0"/>
+          <a:chOff x="0" y="0"/>
+          <a:chExt cx="0" cy="0"/>
+        </a:xfrm>
+      </p:grpSpPr>
+      <p:sp>
+        <p:nvSpPr>
+          <p:cNvPr id="468" name="Google Shape;468;g385e776578a_0_49:notes"/>
+          <p:cNvSpPr/>
+          <p:nvPr>
+            <p:ph idx="2" type="sldImg"/>
+          </p:nvPr>
+        </p:nvSpPr>
+        <p:spPr>
+          <a:xfrm>
+            <a:off x="381300" y="685800"/>
+            <a:ext cx="6096000" cy="3429000"/>
+          </a:xfrm>
+          <a:custGeom>
+            <a:rect b="b" l="l" r="r" t="t"/>
+            <a:pathLst>
+              <a:path extrusionOk="0" h="120000" w="120000">
+                <a:moveTo>
+                  <a:pt x="0" y="0"/>
+                </a:moveTo>
+                <a:lnTo>
+                  <a:pt x="120000" y="0"/>
+                </a:lnTo>
+                <a:lnTo>
+                  <a:pt x="120000" y="120000"/>
+                </a:lnTo>
+                <a:lnTo>
+                  <a:pt x="0" y="120000"/>
+                </a:lnTo>
+                <a:close/>
+              </a:path>
+            </a:pathLst>
+          </a:custGeom>
+        </p:spPr>
+      </p:sp>
+      <p:sp>
+        <p:nvSpPr>
+          <p:cNvPr id="469" name="Google Shape;469;g385e776578a_0_49:notes"/>
+          <p:cNvSpPr txBox="1"/>
+          <p:nvPr>
+            <p:ph idx="1" type="body"/>
+          </p:nvPr>
+        </p:nvSpPr>
+        <p:spPr>
+          <a:xfrm>
+            <a:off x="685800" y="4343400"/>
+            <a:ext cx="5486400" cy="4114800"/>
+          </a:xfrm>
+          <a:prstGeom prst="rect">
+            <a:avLst/>
+          </a:prstGeom>
+        </p:spPr>
+        <p:txBody>
+          <a:bodyPr anchorCtr="0" anchor="t" bIns="91425" lIns="91425" spcFirstLastPara="1" rIns="91425" wrap="square" tIns="91425">
+            <a:noAutofit/>
+          </a:bodyPr>
+          <a:lstStyle/>
+          <a:p>
+            <a:pPr indent="0" lvl="0" marL="0" rtl="0" algn="l">
+              <a:spcBef>
+                <a:spcPts val="0"/>
+              </a:spcBef>
+              <a:spcAft>
+                <a:spcPts val="0"/>
+              </a:spcAft>
+              <a:buNone/>
+            </a:pPr>
+            <a:r>
+              <a:t/>
+            </a:r>
+            <a:endParaRPr/>
+          </a:p>
+        </p:txBody>
+      </p:sp>
+    </p:spTree>
+  </p:cSld>
+  <p:clrMapOvr>
+    <a:masterClrMapping/>
+  </p:clrMapOvr>
+</p:notes>
+</file>
+
+<file path=ppt/notesSlides/notesSlide42.xml><?xml version="1.0" encoding="utf-8"?>
+<p:notes xmlns:a="http://schemas.openxmlformats.org/drawingml/2006/main" xmlns:r="http://schemas.openxmlformats.org/officeDocument/2006/relationships" xmlns:mc="http://schemas.openxmlformats.org/markup-compatibility/2006" xmlns:mv="urn:schemas-microsoft-com:mac:vml" xmlns:p="http://schemas.openxmlformats.org/presentationml/2006/main" xmlns:c="http://schemas.openxmlformats.org/drawingml/2006/chart" xmlns:dgm="http://schemas.openxmlformats.org/drawingml/2006/diagram" xmlns:o="urn:schemas-microsoft-com:office:office" xmlns:v="urn:schemas-microsoft-com:vml" xmlns:pvml="urn:schemas-microsoft-com:office:powerpoint" xmlns:com="http://schemas.openxmlformats.org/drawingml/2006/compatibility" xmlns:p14="http://schemas.microsoft.com/office/powerpoint/2010/main" xmlns:p15="http://schemas.microsoft.com/office/powerpoint/2012/main" xmlns:ahyp="http://schemas.microsoft.com/office/drawing/2018/hyperlinkcolor" showMasterPhAnim="0" showMasterSp="0">
+  <p:cSld>
+    <p:spTree>
+      <p:nvGrpSpPr>
+        <p:cNvPr id="473" name="Shape 473"/>
+        <p:cNvGrpSpPr/>
+        <p:nvPr/>
+      </p:nvGrpSpPr>
+      <p:grpSpPr>
+        <a:xfrm>
+          <a:off x="0" y="0"/>
+          <a:ext cx="0" cy="0"/>
+          <a:chOff x="0" y="0"/>
+          <a:chExt cx="0" cy="0"/>
+        </a:xfrm>
+      </p:grpSpPr>
+      <p:sp>
+        <p:nvSpPr>
+          <p:cNvPr id="474" name="Google Shape;474;g385e776578a_0_43:notes"/>
+          <p:cNvSpPr/>
+          <p:nvPr>
+            <p:ph idx="2" type="sldImg"/>
+          </p:nvPr>
+        </p:nvSpPr>
+        <p:spPr>
+          <a:xfrm>
+            <a:off x="381300" y="685800"/>
+            <a:ext cx="6096000" cy="3429000"/>
+          </a:xfrm>
+          <a:custGeom>
+            <a:rect b="b" l="l" r="r" t="t"/>
+            <a:pathLst>
+              <a:path extrusionOk="0" h="120000" w="120000">
+                <a:moveTo>
+                  <a:pt x="0" y="0"/>
+                </a:moveTo>
+                <a:lnTo>
+                  <a:pt x="120000" y="0"/>
+                </a:lnTo>
+                <a:lnTo>
+                  <a:pt x="120000" y="120000"/>
+                </a:lnTo>
+                <a:lnTo>
+                  <a:pt x="0" y="120000"/>
+                </a:lnTo>
+                <a:close/>
+              </a:path>
+            </a:pathLst>
+          </a:custGeom>
+        </p:spPr>
+      </p:sp>
+      <p:sp>
+        <p:nvSpPr>
+          <p:cNvPr id="475" name="Google Shape;475;g385e776578a_0_43:notes"/>
           <p:cNvSpPr txBox="1"/>
           <p:nvPr>
             <p:ph idx="1" type="body"/>
@@ -12881,14 +13181,18 @@
               <a:buNone/>
             </a:pPr>
             <a:r>
-              <a:rPr lang="pt-BR"/>
-              <a:t>Criando e executando o </a:t>
+              <a:rPr lang="pt-BR" sz="1500"/>
+              <a:t> Como criar e gerenciar</a:t>
             </a:r>
             <a:r>
-              <a:rPr lang="pt-BR"/>
+              <a:rPr lang="pt-BR" sz="1500"/>
+              <a:t> </a:t>
+            </a:r>
+            <a:r>
+              <a:rPr lang="pt-BR" sz="1500"/>
               <a:t>seu primeiro container</a:t>
             </a:r>
-            <a:endParaRPr/>
+            <a:endParaRPr sz="1500"/>
           </a:p>
         </p:txBody>
       </p:sp>
@@ -14211,8 +14515,8 @@
         </p:blipFill>
         <p:spPr>
           <a:xfrm>
-            <a:off x="1506188" y="1729425"/>
-            <a:ext cx="2262775" cy="2262775"/>
+            <a:off x="4066486" y="1307850"/>
+            <a:ext cx="1011025" cy="1011050"/>
           </a:xfrm>
           <a:prstGeom prst="rect">
             <a:avLst/>
@@ -14233,7 +14537,7 @@
         </p:nvSpPr>
         <p:spPr>
           <a:xfrm>
-            <a:off x="311713" y="4126950"/>
+            <a:off x="311713" y="3684750"/>
             <a:ext cx="4260300" cy="442200"/>
           </a:xfrm>
           <a:prstGeom prst="rect">
@@ -14263,37 +14567,9 @@
           </a:p>
         </p:txBody>
       </p:sp>
-      <p:pic>
-        <p:nvPicPr>
-          <p:cNvPr id="270" name="Google Shape;270;p24" title="yaml-file-icon.png"/>
-          <p:cNvPicPr preferRelativeResize="0"/>
-          <p:nvPr/>
-        </p:nvPicPr>
-        <p:blipFill>
-          <a:blip r:embed="rId3">
-            <a:alphaModFix/>
-          </a:blip>
-          <a:stretch>
-            <a:fillRect/>
-          </a:stretch>
-        </p:blipFill>
-        <p:spPr>
-          <a:xfrm>
-            <a:off x="5766462" y="1729425"/>
-            <a:ext cx="2262775" cy="2262775"/>
-          </a:xfrm>
-          <a:prstGeom prst="rect">
-            <a:avLst/>
-          </a:prstGeom>
-          <a:noFill/>
-          <a:ln>
-            <a:noFill/>
-          </a:ln>
-        </p:spPr>
-      </p:pic>
       <p:sp>
         <p:nvSpPr>
-          <p:cNvPr id="271" name="Google Shape;271;p24"/>
+          <p:cNvPr id="270" name="Google Shape;270;p24"/>
           <p:cNvSpPr txBox="1"/>
           <p:nvPr>
             <p:ph idx="1" type="body"/>
@@ -14301,7 +14577,7 @@
         </p:nvSpPr>
         <p:spPr>
           <a:xfrm>
-            <a:off x="4571988" y="4126950"/>
+            <a:off x="4571988" y="3684750"/>
             <a:ext cx="4260300" cy="442200"/>
           </a:xfrm>
           <a:prstGeom prst="rect">
@@ -14326,6 +14602,102 @@
             <a:r>
               <a:rPr lang="pt-BR"/>
               <a:t>dockerfile.prod</a:t>
+            </a:r>
+            <a:endParaRPr/>
+          </a:p>
+        </p:txBody>
+      </p:sp>
+      <p:pic>
+        <p:nvPicPr>
+          <p:cNvPr id="271" name="Google Shape;271;p24" title="dockerfile.png"/>
+          <p:cNvPicPr preferRelativeResize="0"/>
+          <p:nvPr/>
+        </p:nvPicPr>
+        <p:blipFill>
+          <a:blip r:embed="rId4">
+            <a:alphaModFix/>
+          </a:blip>
+          <a:stretch>
+            <a:fillRect/>
+          </a:stretch>
+        </p:blipFill>
+        <p:spPr>
+          <a:xfrm>
+            <a:off x="1453791" y="1872737"/>
+            <a:ext cx="1976125" cy="1976150"/>
+          </a:xfrm>
+          <a:prstGeom prst="rect">
+            <a:avLst/>
+          </a:prstGeom>
+          <a:noFill/>
+          <a:ln>
+            <a:noFill/>
+          </a:ln>
+        </p:spPr>
+      </p:pic>
+      <p:pic>
+        <p:nvPicPr>
+          <p:cNvPr id="272" name="Google Shape;272;p24" title="dockerfile.png"/>
+          <p:cNvPicPr preferRelativeResize="0"/>
+          <p:nvPr/>
+        </p:nvPicPr>
+        <p:blipFill>
+          <a:blip r:embed="rId4">
+            <a:alphaModFix/>
+          </a:blip>
+          <a:stretch>
+            <a:fillRect/>
+          </a:stretch>
+        </p:blipFill>
+        <p:spPr>
+          <a:xfrm>
+            <a:off x="5714041" y="1872750"/>
+            <a:ext cx="1976125" cy="1976150"/>
+          </a:xfrm>
+          <a:prstGeom prst="rect">
+            <a:avLst/>
+          </a:prstGeom>
+          <a:noFill/>
+          <a:ln>
+            <a:noFill/>
+          </a:ln>
+        </p:spPr>
+      </p:pic>
+      <p:sp>
+        <p:nvSpPr>
+          <p:cNvPr id="273" name="Google Shape;273;p24"/>
+          <p:cNvSpPr txBox="1"/>
+          <p:nvPr>
+            <p:ph idx="1" type="body"/>
+          </p:nvPr>
+        </p:nvSpPr>
+        <p:spPr>
+          <a:xfrm>
+            <a:off x="2390513" y="2275200"/>
+            <a:ext cx="4260300" cy="442200"/>
+          </a:xfrm>
+          <a:prstGeom prst="rect">
+            <a:avLst/>
+          </a:prstGeom>
+        </p:spPr>
+        <p:txBody>
+          <a:bodyPr anchorCtr="0" anchor="t" bIns="91425" lIns="91425" spcFirstLastPara="1" rIns="91425" wrap="square" tIns="91425">
+            <a:normAutofit/>
+          </a:bodyPr>
+          <a:lstStyle/>
+          <a:p>
+            <a:pPr indent="0" lvl="0" marL="0" rtl="0" algn="ctr">
+              <a:spcBef>
+                <a:spcPts val="0"/>
+              </a:spcBef>
+              <a:spcAft>
+                <a:spcPts val="1200"/>
+              </a:spcAft>
+              <a:buNone/>
+            </a:pPr>
+            <a:r>
+              <a:rPr lang="pt-BR"/>
+              <a:t>docker-compose.yaml</a:t>
             </a:r>
             <a:endParaRPr/>
           </a:p>
@@ -14344,7 +14716,7 @@
   <p:cSld>
     <p:spTree>
       <p:nvGrpSpPr>
-        <p:cNvPr id="275" name="Shape 275"/>
+        <p:cNvPr id="277" name="Shape 277"/>
         <p:cNvGrpSpPr/>
         <p:nvPr/>
       </p:nvGrpSpPr>
@@ -14358,7 +14730,7 @@
       </p:grpSpPr>
       <p:sp>
         <p:nvSpPr>
-          <p:cNvPr id="276" name="Google Shape;276;p25"/>
+          <p:cNvPr id="278" name="Google Shape;278;p25"/>
           <p:cNvSpPr txBox="1"/>
           <p:nvPr>
             <p:ph type="title"/>
@@ -14418,7 +14790,7 @@
       </p:sp>
       <p:sp>
         <p:nvSpPr>
-          <p:cNvPr id="277" name="Google Shape;277;p25"/>
+          <p:cNvPr id="279" name="Google Shape;279;p25"/>
           <p:cNvSpPr txBox="1"/>
           <p:nvPr>
             <p:ph idx="1" type="body"/>
@@ -14458,7 +14830,7 @@
       </p:sp>
       <p:sp>
         <p:nvSpPr>
-          <p:cNvPr id="278" name="Google Shape;278;p25"/>
+          <p:cNvPr id="280" name="Google Shape;280;p25"/>
           <p:cNvSpPr txBox="1"/>
           <p:nvPr>
             <p:ph idx="1" type="body"/>
@@ -14498,7 +14870,7 @@
       </p:sp>
       <p:pic>
         <p:nvPicPr>
-          <p:cNvPr id="279" name="Google Shape;279;p25" title="6478099.png"/>
+          <p:cNvPr id="281" name="Google Shape;281;p25" title="6478099.png"/>
           <p:cNvPicPr preferRelativeResize="0"/>
           <p:nvPr/>
         </p:nvPicPr>
@@ -14526,7 +14898,7 @@
       </p:pic>
       <p:pic>
         <p:nvPicPr>
-          <p:cNvPr id="280" name="Google Shape;280;p25" title="iconfinder-server-4417119_116634.png"/>
+          <p:cNvPr id="282" name="Google Shape;282;p25" title="iconfinder-server-4417119_116634.png"/>
           <p:cNvPicPr preferRelativeResize="0"/>
           <p:nvPr/>
         </p:nvPicPr>
@@ -14554,7 +14926,7 @@
       </p:pic>
       <p:pic>
         <p:nvPicPr>
-          <p:cNvPr id="281" name="Google Shape;281;p25" title="pngimg.com - php_PNG35.png"/>
+          <p:cNvPr id="283" name="Google Shape;283;p25" title="pngimg.com - php_PNG35.png"/>
           <p:cNvPicPr preferRelativeResize="0"/>
           <p:nvPr/>
         </p:nvPicPr>
@@ -14582,7 +14954,7 @@
       </p:pic>
       <p:pic>
         <p:nvPicPr>
-          <p:cNvPr id="282" name="Google Shape;282;p25" title="apache-logo-1.png"/>
+          <p:cNvPr id="284" name="Google Shape;284;p25" title="apache-logo-1.png"/>
           <p:cNvPicPr preferRelativeResize="0"/>
           <p:nvPr/>
         </p:nvPicPr>
@@ -14610,7 +14982,7 @@
       </p:pic>
       <p:pic>
         <p:nvPicPr>
-          <p:cNvPr id="283" name="Google Shape;283;p25" title="2560px-Logo.min_.svg_-1024x297.png"/>
+          <p:cNvPr id="285" name="Google Shape;285;p25" title="2560px-Logo.min_.svg_-1024x297.png"/>
           <p:cNvPicPr preferRelativeResize="0"/>
           <p:nvPr/>
         </p:nvPicPr>
@@ -14638,7 +15010,7 @@
       </p:pic>
       <p:sp>
         <p:nvSpPr>
-          <p:cNvPr id="284" name="Google Shape;284;p25"/>
+          <p:cNvPr id="286" name="Google Shape;286;p25"/>
           <p:cNvSpPr txBox="1"/>
           <p:nvPr>
             <p:ph idx="1" type="body"/>
@@ -14692,7 +15064,7 @@
       </p:sp>
       <p:sp>
         <p:nvSpPr>
-          <p:cNvPr id="285" name="Google Shape;285;p25"/>
+          <p:cNvPr id="287" name="Google Shape;287;p25"/>
           <p:cNvSpPr txBox="1"/>
           <p:nvPr>
             <p:ph idx="1" type="body"/>
@@ -14757,7 +15129,7 @@
   <p:cSld>
     <p:spTree>
       <p:nvGrpSpPr>
-        <p:cNvPr id="289" name="Shape 289"/>
+        <p:cNvPr id="291" name="Shape 291"/>
         <p:cNvGrpSpPr/>
         <p:nvPr/>
       </p:nvGrpSpPr>
@@ -14771,7 +15143,7 @@
       </p:grpSpPr>
       <p:sp>
         <p:nvSpPr>
-          <p:cNvPr id="290" name="Google Shape;290;p26"/>
+          <p:cNvPr id="292" name="Google Shape;292;p26"/>
           <p:cNvSpPr txBox="1"/>
           <p:nvPr>
             <p:ph idx="1" type="body"/>
@@ -14811,7 +15183,7 @@
       </p:sp>
       <p:sp>
         <p:nvSpPr>
-          <p:cNvPr id="291" name="Google Shape;291;p26"/>
+          <p:cNvPr id="293" name="Google Shape;293;p26"/>
           <p:cNvSpPr txBox="1"/>
           <p:nvPr>
             <p:ph type="title"/>
@@ -14863,7 +15235,7 @@
   <p:cSld>
     <p:spTree>
       <p:nvGrpSpPr>
-        <p:cNvPr id="295" name="Shape 295"/>
+        <p:cNvPr id="297" name="Shape 297"/>
         <p:cNvGrpSpPr/>
         <p:nvPr/>
       </p:nvGrpSpPr>
@@ -14877,7 +15249,7 @@
       </p:grpSpPr>
       <p:sp>
         <p:nvSpPr>
-          <p:cNvPr id="296" name="Google Shape;296;p27"/>
+          <p:cNvPr id="298" name="Google Shape;298;p27"/>
           <p:cNvSpPr txBox="1"/>
           <p:nvPr>
             <p:ph type="title"/>
@@ -14918,7 +15290,7 @@
       </p:sp>
       <p:sp>
         <p:nvSpPr>
-          <p:cNvPr id="297" name="Google Shape;297;p27"/>
+          <p:cNvPr id="299" name="Google Shape;299;p27"/>
           <p:cNvSpPr txBox="1"/>
           <p:nvPr>
             <p:ph idx="1" type="body"/>
@@ -14985,7 +15357,7 @@
       </p:sp>
       <p:pic>
         <p:nvPicPr>
-          <p:cNvPr id="298" name="Google Shape;298;p27" title="168493058-c10bc59c-4bda-4f00-95a7-5356c2ef7534.png"/>
+          <p:cNvPr id="300" name="Google Shape;300;p27" title="168493058-c10bc59c-4bda-4f00-95a7-5356c2ef7534.png"/>
           <p:cNvPicPr preferRelativeResize="0"/>
           <p:nvPr/>
         </p:nvPicPr>
@@ -15013,7 +15385,7 @@
       </p:pic>
       <p:sp>
         <p:nvSpPr>
-          <p:cNvPr id="299" name="Google Shape;299;p27"/>
+          <p:cNvPr id="301" name="Google Shape;301;p27"/>
           <p:cNvSpPr txBox="1"/>
           <p:nvPr>
             <p:ph idx="1" type="body"/>
@@ -15080,7 +15452,7 @@
       </p:sp>
       <p:pic>
         <p:nvPicPr>
-          <p:cNvPr id="300" name="Google Shape;300;p27" title="pngtree-fiery-vs-logo-clipart-battle-symbol-competition-icon-red-and-yellow-png-image_15949514.png"/>
+          <p:cNvPr id="302" name="Google Shape;302;p27" title="pngtree-fiery-vs-logo-clipart-battle-symbol-competition-icon-red-and-yellow-png-image_15949514.png"/>
           <p:cNvPicPr preferRelativeResize="0"/>
           <p:nvPr/>
         </p:nvPicPr>
@@ -15096,61 +15468,6 @@
           <a:xfrm>
             <a:off x="3827862" y="2154875"/>
             <a:ext cx="1676700" cy="1676700"/>
-          </a:xfrm>
-          <a:prstGeom prst="rect">
-            <a:avLst/>
-          </a:prstGeom>
-          <a:noFill/>
-          <a:ln>
-            <a:noFill/>
-          </a:ln>
-        </p:spPr>
-      </p:pic>
-      <p:pic>
-        <p:nvPicPr>
-          <p:cNvPr id="301" name="Google Shape;301;p27" title="docker-moby-512.png"/>
-          <p:cNvPicPr preferRelativeResize="0"/>
-          <p:nvPr/>
-        </p:nvPicPr>
-        <p:blipFill>
-          <a:blip r:embed="rId5">
-            <a:alphaModFix/>
-          </a:blip>
-          <a:stretch>
-            <a:fillRect/>
-          </a:stretch>
-        </p:blipFill>
-        <p:spPr>
-          <a:xfrm>
-            <a:off x="1672913" y="1621338"/>
-            <a:ext cx="2058275" cy="2058275"/>
-          </a:xfrm>
-          <a:prstGeom prst="rect">
-            <a:avLst/>
-          </a:prstGeom>
-          <a:noFill/>
-          <a:ln>
-            <a:noFill/>
-          </a:ln>
-        </p:spPr>
-      </p:pic>
-      <p:pic>
-        <p:nvPicPr>
-          <p:cNvPr id="302" name="Google Shape;302;p27" title="xlinux-terminal-on-ubuntu.png.pagespeed.gpjpjwpjwsjsrjrprwricpmd.ic_.-XaWFngjEl1.jpg"/>
-          <p:cNvPicPr preferRelativeResize="0"/>
-          <p:nvPr/>
-        </p:nvPicPr>
-        <p:blipFill rotWithShape="1">
-          <a:blip r:embed="rId6">
-            <a:alphaModFix/>
-          </a:blip>
-          <a:srcRect b="0" l="0" r="29661" t="0"/>
-          <a:stretch/>
-        </p:blipFill>
-        <p:spPr>
-          <a:xfrm>
-            <a:off x="5723625" y="1621350"/>
-            <a:ext cx="1832425" cy="1079400"/>
           </a:xfrm>
           <a:prstGeom prst="rect">
             <a:avLst/>
@@ -15177,6 +15494,61 @@
         </p:blipFill>
         <p:spPr>
           <a:xfrm>
+            <a:off x="1672913" y="1621338"/>
+            <a:ext cx="2058275" cy="2058275"/>
+          </a:xfrm>
+          <a:prstGeom prst="rect">
+            <a:avLst/>
+          </a:prstGeom>
+          <a:noFill/>
+          <a:ln>
+            <a:noFill/>
+          </a:ln>
+        </p:spPr>
+      </p:pic>
+      <p:pic>
+        <p:nvPicPr>
+          <p:cNvPr id="304" name="Google Shape;304;p27" title="xlinux-terminal-on-ubuntu.png.pagespeed.gpjpjwpjwsjsrjrprwricpmd.ic_.-XaWFngjEl1.jpg"/>
+          <p:cNvPicPr preferRelativeResize="0"/>
+          <p:nvPr/>
+        </p:nvPicPr>
+        <p:blipFill rotWithShape="1">
+          <a:blip r:embed="rId6">
+            <a:alphaModFix/>
+          </a:blip>
+          <a:srcRect b="0" l="0" r="29661" t="0"/>
+          <a:stretch/>
+        </p:blipFill>
+        <p:spPr>
+          <a:xfrm>
+            <a:off x="5723625" y="1621350"/>
+            <a:ext cx="1832425" cy="1079400"/>
+          </a:xfrm>
+          <a:prstGeom prst="rect">
+            <a:avLst/>
+          </a:prstGeom>
+          <a:noFill/>
+          <a:ln>
+            <a:noFill/>
+          </a:ln>
+        </p:spPr>
+      </p:pic>
+      <p:pic>
+        <p:nvPicPr>
+          <p:cNvPr id="305" name="Google Shape;305;p27" title="docker-moby-512.png"/>
+          <p:cNvPicPr preferRelativeResize="0"/>
+          <p:nvPr/>
+        </p:nvPicPr>
+        <p:blipFill>
+          <a:blip r:embed="rId5">
+            <a:alphaModFix/>
+          </a:blip>
+          <a:stretch>
+            <a:fillRect/>
+          </a:stretch>
+        </p:blipFill>
+        <p:spPr>
+          <a:xfrm>
             <a:off x="6270513" y="1621338"/>
             <a:ext cx="2058275" cy="2058275"/>
           </a:xfrm>
@@ -15202,7 +15574,7 @@
   <p:cSld>
     <p:spTree>
       <p:nvGrpSpPr>
-        <p:cNvPr id="307" name="Shape 307"/>
+        <p:cNvPr id="309" name="Shape 309"/>
         <p:cNvGrpSpPr/>
         <p:nvPr/>
       </p:nvGrpSpPr>
@@ -15216,7 +15588,7 @@
       </p:grpSpPr>
       <p:sp>
         <p:nvSpPr>
-          <p:cNvPr id="308" name="Google Shape;308;p28"/>
+          <p:cNvPr id="310" name="Google Shape;310;p28"/>
           <p:cNvSpPr txBox="1"/>
           <p:nvPr>
             <p:ph type="title"/>
@@ -15257,7 +15629,7 @@
       </p:sp>
       <p:pic>
         <p:nvPicPr>
-          <p:cNvPr id="309" name="Google Shape;309;p28" title="Tux.svg.png"/>
+          <p:cNvPr id="311" name="Google Shape;311;p28" title="Tux.svg.png"/>
           <p:cNvPicPr preferRelativeResize="0"/>
           <p:nvPr/>
         </p:nvPicPr>
@@ -15296,7 +15668,7 @@
   <p:cSld>
     <p:spTree>
       <p:nvGrpSpPr>
-        <p:cNvPr id="313" name="Shape 313"/>
+        <p:cNvPr id="315" name="Shape 315"/>
         <p:cNvGrpSpPr/>
         <p:nvPr/>
       </p:nvGrpSpPr>
@@ -15310,7 +15682,7 @@
       </p:grpSpPr>
       <p:sp>
         <p:nvSpPr>
-          <p:cNvPr id="314" name="Google Shape;314;p29"/>
+          <p:cNvPr id="316" name="Google Shape;316;p29"/>
           <p:cNvSpPr txBox="1"/>
           <p:nvPr>
             <p:ph type="title"/>
@@ -15351,7 +15723,7 @@
       </p:sp>
       <p:pic>
         <p:nvPicPr>
-          <p:cNvPr id="315" name="Google Shape;315;p29" title="Windows-10-logo-11.png"/>
+          <p:cNvPr id="317" name="Google Shape;317;p29" title="Windows-10-logo-11.png"/>
           <p:cNvPicPr preferRelativeResize="0"/>
           <p:nvPr/>
         </p:nvPicPr>
@@ -15379,7 +15751,7 @@
       </p:pic>
       <p:sp>
         <p:nvSpPr>
-          <p:cNvPr id="316" name="Google Shape;316;p29"/>
+          <p:cNvPr id="318" name="Google Shape;318;p29"/>
           <p:cNvSpPr txBox="1"/>
           <p:nvPr>
             <p:ph type="title"/>
@@ -15437,7 +15809,7 @@
       </p:sp>
       <p:pic>
         <p:nvPicPr>
-          <p:cNvPr id="317" name="Google Shape;317;p29" title="Tux.svg.png"/>
+          <p:cNvPr id="319" name="Google Shape;319;p29" title="Tux.svg.png"/>
           <p:cNvPicPr preferRelativeResize="0"/>
           <p:nvPr/>
         </p:nvPicPr>
@@ -15465,7 +15837,7 @@
       </p:pic>
       <p:sp>
         <p:nvSpPr>
-          <p:cNvPr id="318" name="Google Shape;318;p29"/>
+          <p:cNvPr id="320" name="Google Shape;320;p29"/>
           <p:cNvSpPr txBox="1"/>
           <p:nvPr>
             <p:ph type="title"/>
@@ -15525,7 +15897,7 @@
   <p:cSld>
     <p:spTree>
       <p:nvGrpSpPr>
-        <p:cNvPr id="322" name="Shape 322"/>
+        <p:cNvPr id="324" name="Shape 324"/>
         <p:cNvGrpSpPr/>
         <p:nvPr/>
       </p:nvGrpSpPr>
@@ -15539,7 +15911,7 @@
       </p:grpSpPr>
       <p:pic>
         <p:nvPicPr>
-          <p:cNvPr id="323" name="Google Shape;323;p30" title="0_kDJEckrqtk653KL_.png"/>
+          <p:cNvPr id="325" name="Google Shape;325;p30" title="0_kDJEckrqtk653KL_.png"/>
           <p:cNvPicPr preferRelativeResize="0"/>
           <p:nvPr/>
         </p:nvPicPr>
@@ -15567,7 +15939,7 @@
       </p:pic>
       <p:sp>
         <p:nvSpPr>
-          <p:cNvPr id="324" name="Google Shape;324;p30"/>
+          <p:cNvPr id="326" name="Google Shape;326;p30"/>
           <p:cNvSpPr txBox="1"/>
           <p:nvPr>
             <p:ph type="title"/>
@@ -15623,7 +15995,7 @@
   <p:cSld>
     <p:spTree>
       <p:nvGrpSpPr>
-        <p:cNvPr id="328" name="Shape 328"/>
+        <p:cNvPr id="330" name="Shape 330"/>
         <p:cNvGrpSpPr/>
         <p:nvPr/>
       </p:nvGrpSpPr>
@@ -15637,7 +16009,7 @@
       </p:grpSpPr>
       <p:sp>
         <p:nvSpPr>
-          <p:cNvPr id="329" name="Google Shape;329;p31"/>
+          <p:cNvPr id="331" name="Google Shape;331;p31"/>
           <p:cNvSpPr txBox="1"/>
           <p:nvPr>
             <p:ph idx="1" type="body"/>
@@ -15677,7 +16049,7 @@
       </p:sp>
       <p:sp>
         <p:nvSpPr>
-          <p:cNvPr id="330" name="Google Shape;330;p31"/>
+          <p:cNvPr id="332" name="Google Shape;332;p31"/>
           <p:cNvSpPr txBox="1"/>
           <p:nvPr>
             <p:ph type="title"/>
@@ -15718,7 +16090,7 @@
       </p:sp>
       <p:pic>
         <p:nvPicPr>
-          <p:cNvPr id="331" name="Google Shape;331;p31" title="0_kDJEckrqtk653KL_.png"/>
+          <p:cNvPr id="333" name="Google Shape;333;p31" title="0_kDJEckrqtk653KL_.png"/>
           <p:cNvPicPr preferRelativeResize="0"/>
           <p:nvPr/>
         </p:nvPicPr>
@@ -15863,7 +16235,7 @@
   <p:cSld>
     <p:spTree>
       <p:nvGrpSpPr>
-        <p:cNvPr id="335" name="Shape 335"/>
+        <p:cNvPr id="337" name="Shape 337"/>
         <p:cNvGrpSpPr/>
         <p:nvPr/>
       </p:nvGrpSpPr>
@@ -15877,7 +16249,7 @@
       </p:grpSpPr>
       <p:sp>
         <p:nvSpPr>
-          <p:cNvPr id="336" name="Google Shape;336;p32"/>
+          <p:cNvPr id="338" name="Google Shape;338;p32"/>
           <p:cNvSpPr txBox="1"/>
           <p:nvPr>
             <p:ph type="title"/>
@@ -15937,7 +16309,7 @@
   <p:cSld>
     <p:spTree>
       <p:nvGrpSpPr>
-        <p:cNvPr id="340" name="Shape 340"/>
+        <p:cNvPr id="342" name="Shape 342"/>
         <p:cNvGrpSpPr/>
         <p:nvPr/>
       </p:nvGrpSpPr>
@@ -15951,7 +16323,7 @@
       </p:grpSpPr>
       <p:sp>
         <p:nvSpPr>
-          <p:cNvPr id="341" name="Google Shape;341;p33"/>
+          <p:cNvPr id="343" name="Google Shape;343;p33"/>
           <p:cNvSpPr txBox="1"/>
           <p:nvPr>
             <p:ph idx="1" type="body"/>
@@ -15996,7 +16368,170 @@
               </a:rPr>
               <a:t>docker pull nome_da_imagem</a:t>
             </a:r>
-            <a:br>
+            <a:endParaRPr sz="5000">
+              <a:solidFill>
+                <a:schemeClr val="dk1"/>
+              </a:solidFill>
+              <a:highlight>
+                <a:schemeClr val="lt2"/>
+              </a:highlight>
+            </a:endParaRPr>
+          </a:p>
+          <a:p>
+            <a:pPr indent="0" lvl="0" marL="76200" marR="76200" rtl="0" algn="ctr">
+              <a:spcBef>
+                <a:spcPts val="0"/>
+              </a:spcBef>
+              <a:spcAft>
+                <a:spcPts val="0"/>
+              </a:spcAft>
+              <a:buNone/>
+            </a:pPr>
+            <a:r>
+              <a:t/>
+            </a:r>
+            <a:endParaRPr sz="2600">
+              <a:solidFill>
+                <a:schemeClr val="lt1"/>
+              </a:solidFill>
+              <a:highlight>
+                <a:schemeClr val="dk1"/>
+              </a:highlight>
+              <a:latin typeface="Roboto Mono"/>
+              <a:ea typeface="Roboto Mono"/>
+              <a:cs typeface="Roboto Mono"/>
+              <a:sym typeface="Roboto Mono"/>
+            </a:endParaRPr>
+          </a:p>
+        </p:txBody>
+      </p:sp>
+      <p:sp>
+        <p:nvSpPr>
+          <p:cNvPr id="344" name="Google Shape;344;p33"/>
+          <p:cNvSpPr txBox="1"/>
+          <p:nvPr>
+            <p:ph type="title"/>
+          </p:nvPr>
+        </p:nvSpPr>
+        <p:spPr>
+          <a:xfrm>
+            <a:off x="447450" y="453250"/>
+            <a:ext cx="8249100" cy="2040600"/>
+          </a:xfrm>
+          <a:prstGeom prst="rect">
+            <a:avLst/>
+          </a:prstGeom>
+        </p:spPr>
+        <p:txBody>
+          <a:bodyPr anchorCtr="0" anchor="t" bIns="91425" lIns="91425" spcFirstLastPara="1" rIns="91425" wrap="square" tIns="91425">
+            <a:noAutofit/>
+          </a:bodyPr>
+          <a:lstStyle/>
+          <a:p>
+            <a:pPr indent="0" lvl="0" marL="0" rtl="0" algn="ctr">
+              <a:spcBef>
+                <a:spcPts val="0"/>
+              </a:spcBef>
+              <a:spcAft>
+                <a:spcPts val="0"/>
+              </a:spcAft>
+              <a:buSzPts val="990"/>
+              <a:buNone/>
+            </a:pPr>
+            <a:r>
+              <a:rPr lang="pt-BR" sz="5420"/>
+              <a:t>Como baixar uma imagem Docker?</a:t>
+            </a:r>
+            <a:endParaRPr sz="5420"/>
+          </a:p>
+        </p:txBody>
+      </p:sp>
+    </p:spTree>
+  </p:cSld>
+  <p:clrMapOvr>
+    <a:masterClrMapping/>
+  </p:clrMapOvr>
+</p:sld>
+</file>
+
+<file path=ppt/slides/slide22.xml><?xml version="1.0" encoding="utf-8"?>
+<p:sld xmlns:a="http://schemas.openxmlformats.org/drawingml/2006/main" xmlns:r="http://schemas.openxmlformats.org/officeDocument/2006/relationships" xmlns:mc="http://schemas.openxmlformats.org/markup-compatibility/2006" xmlns:mv="urn:schemas-microsoft-com:mac:vml" xmlns:p="http://schemas.openxmlformats.org/presentationml/2006/main" xmlns:c="http://schemas.openxmlformats.org/drawingml/2006/chart" xmlns:dgm="http://schemas.openxmlformats.org/drawingml/2006/diagram" xmlns:o="urn:schemas-microsoft-com:office:office" xmlns:v="urn:schemas-microsoft-com:vml" xmlns:pvml="urn:schemas-microsoft-com:office:powerpoint" xmlns:com="http://schemas.openxmlformats.org/drawingml/2006/compatibility" xmlns:p14="http://schemas.microsoft.com/office/powerpoint/2010/main" xmlns:p15="http://schemas.microsoft.com/office/powerpoint/2012/main" xmlns:ahyp="http://schemas.microsoft.com/office/drawing/2018/hyperlinkcolor">
+  <p:cSld>
+    <p:spTree>
+      <p:nvGrpSpPr>
+        <p:cNvPr id="348" name="Shape 348"/>
+        <p:cNvGrpSpPr/>
+        <p:nvPr/>
+      </p:nvGrpSpPr>
+      <p:grpSpPr>
+        <a:xfrm>
+          <a:off x="0" y="0"/>
+          <a:ext cx="0" cy="0"/>
+          <a:chOff x="0" y="0"/>
+          <a:chExt cx="0" cy="0"/>
+        </a:xfrm>
+      </p:grpSpPr>
+      <p:pic>
+        <p:nvPicPr>
+          <p:cNvPr id="349" name="Google Shape;349;p34"/>
+          <p:cNvPicPr preferRelativeResize="0"/>
+          <p:nvPr/>
+        </p:nvPicPr>
+        <p:blipFill>
+          <a:blip r:embed="rId3">
+            <a:alphaModFix/>
+          </a:blip>
+          <a:stretch>
+            <a:fillRect/>
+          </a:stretch>
+        </p:blipFill>
+        <p:spPr>
+          <a:xfrm>
+            <a:off x="0" y="1781946"/>
+            <a:ext cx="9144001" cy="3361553"/>
+          </a:xfrm>
+          <a:prstGeom prst="rect">
+            <a:avLst/>
+          </a:prstGeom>
+          <a:noFill/>
+          <a:ln>
+            <a:noFill/>
+          </a:ln>
+        </p:spPr>
+      </p:pic>
+      <p:sp>
+        <p:nvSpPr>
+          <p:cNvPr id="350" name="Google Shape;350;p34"/>
+          <p:cNvSpPr txBox="1"/>
+          <p:nvPr>
+            <p:ph idx="1" type="body"/>
+          </p:nvPr>
+        </p:nvSpPr>
+        <p:spPr>
+          <a:xfrm>
+            <a:off x="311700" y="205900"/>
+            <a:ext cx="8520600" cy="1525200"/>
+          </a:xfrm>
+          <a:prstGeom prst="rect">
+            <a:avLst/>
+          </a:prstGeom>
+        </p:spPr>
+        <p:txBody>
+          <a:bodyPr anchorCtr="0" anchor="t" bIns="91425" lIns="91425" spcFirstLastPara="1" rIns="91425" wrap="square" tIns="91425">
+            <a:noAutofit/>
+          </a:bodyPr>
+          <a:lstStyle/>
+          <a:p>
+            <a:pPr indent="0" lvl="0" marL="76200" marR="76200" rtl="0" algn="ctr">
+              <a:spcBef>
+                <a:spcPts val="0"/>
+              </a:spcBef>
+              <a:spcAft>
+                <a:spcPts val="0"/>
+              </a:spcAft>
+              <a:buNone/>
+            </a:pPr>
+            <a:r>
               <a:rPr lang="pt-BR" sz="2600">
                 <a:solidFill>
                   <a:schemeClr val="lt1"/>
@@ -16009,7 +16544,8 @@
                 <a:cs typeface="Roboto Mono"/>
                 <a:sym typeface="Roboto Mono"/>
               </a:rPr>
-            </a:br>
+              <a:t>docker pull nome_da_imagem</a:t>
+            </a:r>
             <a:endParaRPr sz="5000">
               <a:solidFill>
                 <a:schemeClr val="lt1"/>
@@ -16110,47 +16646,6 @@
           </a:p>
         </p:txBody>
       </p:sp>
-      <p:sp>
-        <p:nvSpPr>
-          <p:cNvPr id="342" name="Google Shape;342;p33"/>
-          <p:cNvSpPr txBox="1"/>
-          <p:nvPr>
-            <p:ph type="title"/>
-          </p:nvPr>
-        </p:nvSpPr>
-        <p:spPr>
-          <a:xfrm>
-            <a:off x="447450" y="453250"/>
-            <a:ext cx="8249100" cy="2040600"/>
-          </a:xfrm>
-          <a:prstGeom prst="rect">
-            <a:avLst/>
-          </a:prstGeom>
-        </p:spPr>
-        <p:txBody>
-          <a:bodyPr anchorCtr="0" anchor="t" bIns="91425" lIns="91425" spcFirstLastPara="1" rIns="91425" wrap="square" tIns="91425">
-            <a:noAutofit/>
-          </a:bodyPr>
-          <a:lstStyle/>
-          <a:p>
-            <a:pPr indent="0" lvl="0" marL="0" rtl="0" algn="ctr">
-              <a:spcBef>
-                <a:spcPts val="0"/>
-              </a:spcBef>
-              <a:spcAft>
-                <a:spcPts val="0"/>
-              </a:spcAft>
-              <a:buSzPts val="990"/>
-              <a:buNone/>
-            </a:pPr>
-            <a:r>
-              <a:rPr lang="pt-BR" sz="5420"/>
-              <a:t>Como baixar uma imagem Docker?</a:t>
-            </a:r>
-            <a:endParaRPr sz="5420"/>
-          </a:p>
-        </p:txBody>
-      </p:sp>
     </p:spTree>
   </p:cSld>
   <p:clrMapOvr>
@@ -16159,12 +16654,65 @@
 </p:sld>
 </file>
 
-<file path=ppt/slides/slide22.xml><?xml version="1.0" encoding="utf-8"?>
+<file path=ppt/slides/slide23.xml><?xml version="1.0" encoding="utf-8"?>
 <p:sld xmlns:a="http://schemas.openxmlformats.org/drawingml/2006/main" xmlns:r="http://schemas.openxmlformats.org/officeDocument/2006/relationships" xmlns:mc="http://schemas.openxmlformats.org/markup-compatibility/2006" xmlns:mv="urn:schemas-microsoft-com:mac:vml" xmlns:p="http://schemas.openxmlformats.org/presentationml/2006/main" xmlns:c="http://schemas.openxmlformats.org/drawingml/2006/chart" xmlns:dgm="http://schemas.openxmlformats.org/drawingml/2006/diagram" xmlns:o="urn:schemas-microsoft-com:office:office" xmlns:v="urn:schemas-microsoft-com:vml" xmlns:pvml="urn:schemas-microsoft-com:office:powerpoint" xmlns:com="http://schemas.openxmlformats.org/drawingml/2006/compatibility" xmlns:p14="http://schemas.microsoft.com/office/powerpoint/2010/main" xmlns:p15="http://schemas.microsoft.com/office/powerpoint/2012/main" xmlns:ahyp="http://schemas.microsoft.com/office/drawing/2018/hyperlinkcolor">
   <p:cSld>
     <p:spTree>
       <p:nvGrpSpPr>
-        <p:cNvPr id="346" name="Shape 346"/>
+        <p:cNvPr id="354" name="Shape 354"/>
+        <p:cNvGrpSpPr/>
+        <p:nvPr/>
+      </p:nvGrpSpPr>
+      <p:grpSpPr>
+        <a:xfrm>
+          <a:off x="0" y="0"/>
+          <a:ext cx="0" cy="0"/>
+          <a:chOff x="0" y="0"/>
+          <a:chExt cx="0" cy="0"/>
+        </a:xfrm>
+      </p:grpSpPr>
+      <p:pic>
+        <p:nvPicPr>
+          <p:cNvPr id="355" name="Google Shape;355;p35"/>
+          <p:cNvPicPr preferRelativeResize="0"/>
+          <p:nvPr/>
+        </p:nvPicPr>
+        <p:blipFill>
+          <a:blip r:embed="rId3">
+            <a:alphaModFix/>
+          </a:blip>
+          <a:stretch>
+            <a:fillRect/>
+          </a:stretch>
+        </p:blipFill>
+        <p:spPr>
+          <a:xfrm>
+            <a:off x="152400" y="152400"/>
+            <a:ext cx="8839203" cy="4815880"/>
+          </a:xfrm>
+          <a:prstGeom prst="rect">
+            <a:avLst/>
+          </a:prstGeom>
+          <a:noFill/>
+          <a:ln>
+            <a:noFill/>
+          </a:ln>
+        </p:spPr>
+      </p:pic>
+    </p:spTree>
+  </p:cSld>
+  <p:clrMapOvr>
+    <a:masterClrMapping/>
+  </p:clrMapOvr>
+</p:sld>
+</file>
+
+<file path=ppt/slides/slide24.xml><?xml version="1.0" encoding="utf-8"?>
+<p:sld xmlns:a="http://schemas.openxmlformats.org/drawingml/2006/main" xmlns:r="http://schemas.openxmlformats.org/officeDocument/2006/relationships" xmlns:mc="http://schemas.openxmlformats.org/markup-compatibility/2006" xmlns:mv="urn:schemas-microsoft-com:mac:vml" xmlns:p="http://schemas.openxmlformats.org/presentationml/2006/main" xmlns:c="http://schemas.openxmlformats.org/drawingml/2006/chart" xmlns:dgm="http://schemas.openxmlformats.org/drawingml/2006/diagram" xmlns:o="urn:schemas-microsoft-com:office:office" xmlns:v="urn:schemas-microsoft-com:vml" xmlns:pvml="urn:schemas-microsoft-com:office:powerpoint" xmlns:com="http://schemas.openxmlformats.org/drawingml/2006/compatibility" xmlns:p14="http://schemas.microsoft.com/office/powerpoint/2010/main" xmlns:p15="http://schemas.microsoft.com/office/powerpoint/2012/main" xmlns:ahyp="http://schemas.microsoft.com/office/drawing/2018/hyperlinkcolor">
+  <p:cSld>
+    <p:spTree>
+      <p:nvGrpSpPr>
+        <p:cNvPr id="359" name="Shape 359"/>
         <p:cNvGrpSpPr/>
         <p:nvPr/>
       </p:nvGrpSpPr>
@@ -16178,7 +16726,7 @@
       </p:grpSpPr>
       <p:sp>
         <p:nvSpPr>
-          <p:cNvPr id="347" name="Google Shape;347;p34"/>
+          <p:cNvPr id="360" name="Google Shape;360;p36"/>
           <p:cNvSpPr txBox="1"/>
           <p:nvPr>
             <p:ph idx="1" type="body"/>
@@ -16262,7 +16810,7 @@
       </p:sp>
       <p:sp>
         <p:nvSpPr>
-          <p:cNvPr id="348" name="Google Shape;348;p34"/>
+          <p:cNvPr id="361" name="Google Shape;361;p36"/>
           <p:cNvSpPr txBox="1"/>
           <p:nvPr>
             <p:ph type="title"/>
@@ -16301,6 +16849,33 @@
           </a:p>
         </p:txBody>
       </p:sp>
+      <p:pic>
+        <p:nvPicPr>
+          <p:cNvPr id="362" name="Google Shape;362;p36"/>
+          <p:cNvPicPr preferRelativeResize="0"/>
+          <p:nvPr/>
+        </p:nvPicPr>
+        <p:blipFill rotWithShape="1">
+          <a:blip r:embed="rId3">
+            <a:alphaModFix/>
+          </a:blip>
+          <a:srcRect b="22092" l="0" r="0" t="6641"/>
+          <a:stretch/>
+        </p:blipFill>
+        <p:spPr>
+          <a:xfrm>
+            <a:off x="0" y="4205325"/>
+            <a:ext cx="9144000" cy="938175"/>
+          </a:xfrm>
+          <a:prstGeom prst="rect">
+            <a:avLst/>
+          </a:prstGeom>
+          <a:noFill/>
+          <a:ln>
+            <a:noFill/>
+          </a:ln>
+        </p:spPr>
+      </p:pic>
     </p:spTree>
   </p:cSld>
   <p:clrMapOvr>
@@ -16309,12 +16884,12 @@
 </p:sld>
 </file>
 
-<file path=ppt/slides/slide23.xml><?xml version="1.0" encoding="utf-8"?>
+<file path=ppt/slides/slide25.xml><?xml version="1.0" encoding="utf-8"?>
 <p:sld xmlns:a="http://schemas.openxmlformats.org/drawingml/2006/main" xmlns:r="http://schemas.openxmlformats.org/officeDocument/2006/relationships" xmlns:mc="http://schemas.openxmlformats.org/markup-compatibility/2006" xmlns:mv="urn:schemas-microsoft-com:mac:vml" xmlns:p="http://schemas.openxmlformats.org/presentationml/2006/main" xmlns:c="http://schemas.openxmlformats.org/drawingml/2006/chart" xmlns:dgm="http://schemas.openxmlformats.org/drawingml/2006/diagram" xmlns:o="urn:schemas-microsoft-com:office:office" xmlns:v="urn:schemas-microsoft-com:vml" xmlns:pvml="urn:schemas-microsoft-com:office:powerpoint" xmlns:com="http://schemas.openxmlformats.org/drawingml/2006/compatibility" xmlns:p14="http://schemas.microsoft.com/office/powerpoint/2010/main" xmlns:p15="http://schemas.microsoft.com/office/powerpoint/2012/main" xmlns:ahyp="http://schemas.microsoft.com/office/drawing/2018/hyperlinkcolor">
   <p:cSld>
     <p:spTree>
       <p:nvGrpSpPr>
-        <p:cNvPr id="352" name="Shape 352"/>
+        <p:cNvPr id="366" name="Shape 366"/>
         <p:cNvGrpSpPr/>
         <p:nvPr/>
       </p:nvGrpSpPr>
@@ -16328,7 +16903,7 @@
       </p:grpSpPr>
       <p:sp>
         <p:nvSpPr>
-          <p:cNvPr id="353" name="Google Shape;353;p35"/>
+          <p:cNvPr id="367" name="Google Shape;367;p37"/>
           <p:cNvSpPr txBox="1"/>
           <p:nvPr>
             <p:ph idx="1" type="body"/>
@@ -16390,7 +16965,7 @@
       </p:sp>
       <p:sp>
         <p:nvSpPr>
-          <p:cNvPr id="354" name="Google Shape;354;p35"/>
+          <p:cNvPr id="368" name="Google Shape;368;p37"/>
           <p:cNvSpPr txBox="1"/>
           <p:nvPr>
             <p:ph type="title"/>
@@ -16429,6 +17004,33 @@
           </a:p>
         </p:txBody>
       </p:sp>
+      <p:pic>
+        <p:nvPicPr>
+          <p:cNvPr id="369" name="Google Shape;369;p37"/>
+          <p:cNvPicPr preferRelativeResize="0"/>
+          <p:nvPr/>
+        </p:nvPicPr>
+        <p:blipFill rotWithShape="1">
+          <a:blip r:embed="rId3">
+            <a:alphaModFix/>
+          </a:blip>
+          <a:srcRect b="0" l="0" r="0" t="25534"/>
+          <a:stretch/>
+        </p:blipFill>
+        <p:spPr>
+          <a:xfrm>
+            <a:off x="0" y="4595525"/>
+            <a:ext cx="9144000" cy="547975"/>
+          </a:xfrm>
+          <a:prstGeom prst="rect">
+            <a:avLst/>
+          </a:prstGeom>
+          <a:noFill/>
+          <a:ln>
+            <a:noFill/>
+          </a:ln>
+        </p:spPr>
+      </p:pic>
     </p:spTree>
   </p:cSld>
   <p:clrMapOvr>
@@ -16437,12 +17039,12 @@
 </p:sld>
 </file>
 
-<file path=ppt/slides/slide24.xml><?xml version="1.0" encoding="utf-8"?>
+<file path=ppt/slides/slide26.xml><?xml version="1.0" encoding="utf-8"?>
 <p:sld xmlns:a="http://schemas.openxmlformats.org/drawingml/2006/main" xmlns:r="http://schemas.openxmlformats.org/officeDocument/2006/relationships" xmlns:mc="http://schemas.openxmlformats.org/markup-compatibility/2006" xmlns:mv="urn:schemas-microsoft-com:mac:vml" xmlns:p="http://schemas.openxmlformats.org/presentationml/2006/main" xmlns:c="http://schemas.openxmlformats.org/drawingml/2006/chart" xmlns:dgm="http://schemas.openxmlformats.org/drawingml/2006/diagram" xmlns:o="urn:schemas-microsoft-com:office:office" xmlns:v="urn:schemas-microsoft-com:vml" xmlns:pvml="urn:schemas-microsoft-com:office:powerpoint" xmlns:com="http://schemas.openxmlformats.org/drawingml/2006/compatibility" xmlns:p14="http://schemas.microsoft.com/office/powerpoint/2010/main" xmlns:p15="http://schemas.microsoft.com/office/powerpoint/2012/main" xmlns:ahyp="http://schemas.microsoft.com/office/drawing/2018/hyperlinkcolor">
   <p:cSld>
     <p:spTree>
       <p:nvGrpSpPr>
-        <p:cNvPr id="358" name="Shape 358"/>
+        <p:cNvPr id="373" name="Shape 373"/>
         <p:cNvGrpSpPr/>
         <p:nvPr/>
       </p:nvGrpSpPr>
@@ -16456,7 +17058,7 @@
       </p:grpSpPr>
       <p:sp>
         <p:nvSpPr>
-          <p:cNvPr id="359" name="Google Shape;359;p36"/>
+          <p:cNvPr id="374" name="Google Shape;374;p38"/>
           <p:cNvSpPr txBox="1"/>
           <p:nvPr>
             <p:ph idx="1" type="body"/>
@@ -16518,7 +17120,7 @@
       </p:sp>
       <p:sp>
         <p:nvSpPr>
-          <p:cNvPr id="360" name="Google Shape;360;p36"/>
+          <p:cNvPr id="375" name="Google Shape;375;p38"/>
           <p:cNvSpPr txBox="1"/>
           <p:nvPr>
             <p:ph type="title"/>
@@ -16557,6 +17159,33 @@
           </a:p>
         </p:txBody>
       </p:sp>
+      <p:pic>
+        <p:nvPicPr>
+          <p:cNvPr id="376" name="Google Shape;376;p38"/>
+          <p:cNvPicPr preferRelativeResize="0"/>
+          <p:nvPr/>
+        </p:nvPicPr>
+        <p:blipFill rotWithShape="1">
+          <a:blip r:embed="rId3">
+            <a:alphaModFix/>
+          </a:blip>
+          <a:srcRect b="0" l="418" r="0" t="0"/>
+          <a:stretch/>
+        </p:blipFill>
+        <p:spPr>
+          <a:xfrm>
+            <a:off x="0" y="4588905"/>
+            <a:ext cx="9143999" cy="554595"/>
+          </a:xfrm>
+          <a:prstGeom prst="rect">
+            <a:avLst/>
+          </a:prstGeom>
+          <a:noFill/>
+          <a:ln>
+            <a:noFill/>
+          </a:ln>
+        </p:spPr>
+      </p:pic>
     </p:spTree>
   </p:cSld>
   <p:clrMapOvr>
@@ -16565,12 +17194,12 @@
 </p:sld>
 </file>
 
-<file path=ppt/slides/slide25.xml><?xml version="1.0" encoding="utf-8"?>
+<file path=ppt/slides/slide27.xml><?xml version="1.0" encoding="utf-8"?>
 <p:sld xmlns:a="http://schemas.openxmlformats.org/drawingml/2006/main" xmlns:r="http://schemas.openxmlformats.org/officeDocument/2006/relationships" xmlns:mc="http://schemas.openxmlformats.org/markup-compatibility/2006" xmlns:mv="urn:schemas-microsoft-com:mac:vml" xmlns:p="http://schemas.openxmlformats.org/presentationml/2006/main" xmlns:c="http://schemas.openxmlformats.org/drawingml/2006/chart" xmlns:dgm="http://schemas.openxmlformats.org/drawingml/2006/diagram" xmlns:o="urn:schemas-microsoft-com:office:office" xmlns:v="urn:schemas-microsoft-com:vml" xmlns:pvml="urn:schemas-microsoft-com:office:powerpoint" xmlns:com="http://schemas.openxmlformats.org/drawingml/2006/compatibility" xmlns:p14="http://schemas.microsoft.com/office/powerpoint/2010/main" xmlns:p15="http://schemas.microsoft.com/office/powerpoint/2012/main" xmlns:ahyp="http://schemas.microsoft.com/office/drawing/2018/hyperlinkcolor">
   <p:cSld>
     <p:spTree>
       <p:nvGrpSpPr>
-        <p:cNvPr id="364" name="Shape 364"/>
+        <p:cNvPr id="380" name="Shape 380"/>
         <p:cNvGrpSpPr/>
         <p:nvPr/>
       </p:nvGrpSpPr>
@@ -16584,7 +17213,7 @@
       </p:grpSpPr>
       <p:sp>
         <p:nvSpPr>
-          <p:cNvPr id="365" name="Google Shape;365;p37"/>
+          <p:cNvPr id="381" name="Google Shape;381;p39"/>
           <p:cNvSpPr txBox="1"/>
           <p:nvPr>
             <p:ph idx="1" type="body"/>
@@ -16674,7 +17303,7 @@
             </a:endParaRPr>
           </a:p>
           <a:p>
-            <a:pPr indent="0" lvl="0" marL="76200" marR="76200" rtl="0" algn="ctr">
+            <a:pPr indent="0" lvl="0" marL="0" marR="76200" rtl="0" algn="l">
               <a:spcBef>
                 <a:spcPts val="0"/>
               </a:spcBef>
@@ -16688,6 +17317,211 @@
               <a:buFont typeface="Arial"/>
               <a:buNone/>
             </a:pPr>
+            <a:r>
+              <a:t/>
+            </a:r>
+            <a:endParaRPr sz="2600">
+              <a:solidFill>
+                <a:schemeClr val="lt1"/>
+              </a:solidFill>
+              <a:highlight>
+                <a:schemeClr val="dk1"/>
+              </a:highlight>
+              <a:latin typeface="Roboto Mono"/>
+              <a:ea typeface="Roboto Mono"/>
+              <a:cs typeface="Roboto Mono"/>
+              <a:sym typeface="Roboto Mono"/>
+            </a:endParaRPr>
+          </a:p>
+        </p:txBody>
+      </p:sp>
+      <p:sp>
+        <p:nvSpPr>
+          <p:cNvPr id="382" name="Google Shape;382;p39"/>
+          <p:cNvSpPr txBox="1"/>
+          <p:nvPr>
+            <p:ph type="title"/>
+          </p:nvPr>
+        </p:nvSpPr>
+        <p:spPr>
+          <a:xfrm>
+            <a:off x="447450" y="453250"/>
+            <a:ext cx="8249100" cy="2040600"/>
+          </a:xfrm>
+          <a:prstGeom prst="rect">
+            <a:avLst/>
+          </a:prstGeom>
+        </p:spPr>
+        <p:txBody>
+          <a:bodyPr anchorCtr="0" anchor="t" bIns="91425" lIns="91425" spcFirstLastPara="1" rIns="91425" wrap="square" tIns="91425">
+            <a:noAutofit/>
+          </a:bodyPr>
+          <a:lstStyle/>
+          <a:p>
+            <a:pPr indent="0" lvl="0" marL="0" rtl="0" algn="ctr">
+              <a:spcBef>
+                <a:spcPts val="0"/>
+              </a:spcBef>
+              <a:spcAft>
+                <a:spcPts val="0"/>
+              </a:spcAft>
+              <a:buSzPts val="990"/>
+              <a:buNone/>
+            </a:pPr>
+            <a:r>
+              <a:rPr lang="pt-BR" sz="5420"/>
+              <a:t>Como acessar o container?</a:t>
+            </a:r>
+            <a:endParaRPr sz="5420"/>
+          </a:p>
+        </p:txBody>
+      </p:sp>
+      <p:pic>
+        <p:nvPicPr>
+          <p:cNvPr id="383" name="Google Shape;383;p39"/>
+          <p:cNvPicPr preferRelativeResize="0"/>
+          <p:nvPr/>
+        </p:nvPicPr>
+        <p:blipFill>
+          <a:blip r:embed="rId3">
+            <a:alphaModFix/>
+          </a:blip>
+          <a:stretch>
+            <a:fillRect/>
+          </a:stretch>
+        </p:blipFill>
+        <p:spPr>
+          <a:xfrm>
+            <a:off x="0" y="4196450"/>
+            <a:ext cx="9144000" cy="947050"/>
+          </a:xfrm>
+          <a:prstGeom prst="rect">
+            <a:avLst/>
+          </a:prstGeom>
+          <a:noFill/>
+          <a:ln>
+            <a:noFill/>
+          </a:ln>
+        </p:spPr>
+      </p:pic>
+    </p:spTree>
+  </p:cSld>
+  <p:clrMapOvr>
+    <a:masterClrMapping/>
+  </p:clrMapOvr>
+</p:sld>
+</file>
+
+<file path=ppt/slides/slide28.xml><?xml version="1.0" encoding="utf-8"?>
+<p:sld xmlns:a="http://schemas.openxmlformats.org/drawingml/2006/main" xmlns:r="http://schemas.openxmlformats.org/officeDocument/2006/relationships" xmlns:mc="http://schemas.openxmlformats.org/markup-compatibility/2006" xmlns:mv="urn:schemas-microsoft-com:mac:vml" xmlns:p="http://schemas.openxmlformats.org/presentationml/2006/main" xmlns:c="http://schemas.openxmlformats.org/drawingml/2006/chart" xmlns:dgm="http://schemas.openxmlformats.org/drawingml/2006/diagram" xmlns:o="urn:schemas-microsoft-com:office:office" xmlns:v="urn:schemas-microsoft-com:vml" xmlns:pvml="urn:schemas-microsoft-com:office:powerpoint" xmlns:com="http://schemas.openxmlformats.org/drawingml/2006/compatibility" xmlns:p14="http://schemas.microsoft.com/office/powerpoint/2010/main" xmlns:p15="http://schemas.microsoft.com/office/powerpoint/2012/main" xmlns:ahyp="http://schemas.microsoft.com/office/drawing/2018/hyperlinkcolor">
+  <p:cSld>
+    <p:spTree>
+      <p:nvGrpSpPr>
+        <p:cNvPr id="387" name="Shape 387"/>
+        <p:cNvGrpSpPr/>
+        <p:nvPr/>
+      </p:nvGrpSpPr>
+      <p:grpSpPr>
+        <a:xfrm>
+          <a:off x="0" y="0"/>
+          <a:ext cx="0" cy="0"/>
+          <a:chOff x="0" y="0"/>
+          <a:chExt cx="0" cy="0"/>
+        </a:xfrm>
+      </p:grpSpPr>
+      <p:sp>
+        <p:nvSpPr>
+          <p:cNvPr id="388" name="Google Shape;388;p40"/>
+          <p:cNvSpPr txBox="1"/>
+          <p:nvPr>
+            <p:ph idx="1" type="body"/>
+          </p:nvPr>
+        </p:nvSpPr>
+        <p:spPr>
+          <a:xfrm>
+            <a:off x="311700" y="205900"/>
+            <a:ext cx="8520600" cy="1525200"/>
+          </a:xfrm>
+          <a:prstGeom prst="rect">
+            <a:avLst/>
+          </a:prstGeom>
+        </p:spPr>
+        <p:txBody>
+          <a:bodyPr anchorCtr="0" anchor="t" bIns="91425" lIns="91425" spcFirstLastPara="1" rIns="91425" wrap="square" tIns="91425">
+            <a:noAutofit/>
+          </a:bodyPr>
+          <a:lstStyle/>
+          <a:p>
+            <a:pPr indent="0" lvl="0" marL="76200" marR="76200" rtl="0" algn="ctr">
+              <a:spcBef>
+                <a:spcPts val="0"/>
+              </a:spcBef>
+              <a:spcAft>
+                <a:spcPts val="0"/>
+              </a:spcAft>
+              <a:buNone/>
+            </a:pPr>
+            <a:r>
+              <a:rPr lang="pt-BR" sz="2600">
+                <a:highlight>
+                  <a:schemeClr val="dk1"/>
+                </a:highlight>
+                <a:latin typeface="Roboto Mono"/>
+                <a:ea typeface="Roboto Mono"/>
+                <a:cs typeface="Roboto Mono"/>
+                <a:sym typeface="Roboto Mono"/>
+              </a:rPr>
+              <a:t>docker exec -it container_id bash</a:t>
+            </a:r>
+            <a:endParaRPr sz="2600">
+              <a:highlight>
+                <a:schemeClr val="dk1"/>
+              </a:highlight>
+              <a:latin typeface="Roboto Mono"/>
+              <a:ea typeface="Roboto Mono"/>
+              <a:cs typeface="Roboto Mono"/>
+              <a:sym typeface="Roboto Mono"/>
+            </a:endParaRPr>
+          </a:p>
+          <a:p>
+            <a:pPr indent="0" lvl="0" marL="76200" marR="76200" rtl="0" algn="ctr">
+              <a:spcBef>
+                <a:spcPts val="0"/>
+              </a:spcBef>
+              <a:spcAft>
+                <a:spcPts val="0"/>
+              </a:spcAft>
+              <a:buNone/>
+            </a:pPr>
+            <a:r>
+              <a:rPr lang="pt-BR" sz="2600">
+                <a:solidFill>
+                  <a:schemeClr val="dk1"/>
+                </a:solidFill>
+                <a:highlight>
+                  <a:schemeClr val="lt1"/>
+                </a:highlight>
+                <a:latin typeface="Roboto Mono"/>
+                <a:ea typeface="Roboto Mono"/>
+                <a:cs typeface="Roboto Mono"/>
+                <a:sym typeface="Roboto Mono"/>
+              </a:rPr>
+              <a:t>Exemplo:</a:t>
+            </a:r>
+            <a:br>
+              <a:rPr lang="pt-BR" sz="2600">
+                <a:solidFill>
+                  <a:schemeClr val="lt1"/>
+                </a:solidFill>
+                <a:highlight>
+                  <a:schemeClr val="dk1"/>
+                </a:highlight>
+                <a:latin typeface="Roboto Mono"/>
+                <a:ea typeface="Roboto Mono"/>
+                <a:cs typeface="Roboto Mono"/>
+                <a:sym typeface="Roboto Mono"/>
+              </a:rPr>
+            </a:br>
             <a:r>
               <a:rPr lang="pt-BR" sz="2600">
                 <a:solidFill>
@@ -16791,6 +17625,32 @@
             </a:r>
             <a:endParaRPr sz="2600">
               <a:solidFill>
+                <a:schemeClr val="dk1"/>
+              </a:solidFill>
+              <a:highlight>
+                <a:schemeClr val="lt2"/>
+              </a:highlight>
+              <a:latin typeface="Roboto Mono"/>
+              <a:ea typeface="Roboto Mono"/>
+              <a:cs typeface="Roboto Mono"/>
+              <a:sym typeface="Roboto Mono"/>
+            </a:endParaRPr>
+          </a:p>
+          <a:p>
+            <a:pPr indent="0" lvl="0" marL="76200" marR="76200" rtl="0" algn="ctr">
+              <a:spcBef>
+                <a:spcPts val="0"/>
+              </a:spcBef>
+              <a:spcAft>
+                <a:spcPts val="0"/>
+              </a:spcAft>
+              <a:buNone/>
+            </a:pPr>
+            <a:r>
+              <a:t/>
+            </a:r>
+            <a:endParaRPr sz="2600">
+              <a:solidFill>
                 <a:schemeClr val="lt1"/>
               </a:solidFill>
               <a:highlight>
@@ -16804,47 +17664,34 @@
           </a:p>
         </p:txBody>
       </p:sp>
-      <p:sp>
-        <p:nvSpPr>
-          <p:cNvPr id="366" name="Google Shape;366;p37"/>
-          <p:cNvSpPr txBox="1"/>
-          <p:nvPr>
-            <p:ph type="title"/>
-          </p:nvPr>
-        </p:nvSpPr>
-        <p:spPr>
-          <a:xfrm>
-            <a:off x="447450" y="453250"/>
-            <a:ext cx="8249100" cy="2040600"/>
-          </a:xfrm>
-          <a:prstGeom prst="rect">
-            <a:avLst/>
-          </a:prstGeom>
-        </p:spPr>
-        <p:txBody>
-          <a:bodyPr anchorCtr="0" anchor="t" bIns="91425" lIns="91425" spcFirstLastPara="1" rIns="91425" wrap="square" tIns="91425">
-            <a:noAutofit/>
-          </a:bodyPr>
-          <a:lstStyle/>
-          <a:p>
-            <a:pPr indent="0" lvl="0" marL="0" rtl="0" algn="ctr">
-              <a:spcBef>
-                <a:spcPts val="0"/>
-              </a:spcBef>
-              <a:spcAft>
-                <a:spcPts val="0"/>
-              </a:spcAft>
-              <a:buSzPts val="990"/>
-              <a:buNone/>
-            </a:pPr>
-            <a:r>
-              <a:rPr lang="pt-BR" sz="5420"/>
-              <a:t>Como acessar o container?</a:t>
-            </a:r>
-            <a:endParaRPr sz="5420"/>
-          </a:p>
-        </p:txBody>
-      </p:sp>
+      <p:pic>
+        <p:nvPicPr>
+          <p:cNvPr id="389" name="Google Shape;389;p40"/>
+          <p:cNvPicPr preferRelativeResize="0"/>
+          <p:nvPr/>
+        </p:nvPicPr>
+        <p:blipFill>
+          <a:blip r:embed="rId3">
+            <a:alphaModFix/>
+          </a:blip>
+          <a:stretch>
+            <a:fillRect/>
+          </a:stretch>
+        </p:blipFill>
+        <p:spPr>
+          <a:xfrm>
+            <a:off x="0" y="2910343"/>
+            <a:ext cx="9144000" cy="2782957"/>
+          </a:xfrm>
+          <a:prstGeom prst="rect">
+            <a:avLst/>
+          </a:prstGeom>
+          <a:noFill/>
+          <a:ln>
+            <a:noFill/>
+          </a:ln>
+        </p:spPr>
+      </p:pic>
     </p:spTree>
   </p:cSld>
   <p:clrMapOvr>
@@ -16853,12 +17700,12 @@
 </p:sld>
 </file>
 
-<file path=ppt/slides/slide26.xml><?xml version="1.0" encoding="utf-8"?>
+<file path=ppt/slides/slide29.xml><?xml version="1.0" encoding="utf-8"?>
 <p:sld xmlns:a="http://schemas.openxmlformats.org/drawingml/2006/main" xmlns:r="http://schemas.openxmlformats.org/officeDocument/2006/relationships" xmlns:mc="http://schemas.openxmlformats.org/markup-compatibility/2006" xmlns:mv="urn:schemas-microsoft-com:mac:vml" xmlns:p="http://schemas.openxmlformats.org/presentationml/2006/main" xmlns:c="http://schemas.openxmlformats.org/drawingml/2006/chart" xmlns:dgm="http://schemas.openxmlformats.org/drawingml/2006/diagram" xmlns:o="urn:schemas-microsoft-com:office:office" xmlns:v="urn:schemas-microsoft-com:vml" xmlns:pvml="urn:schemas-microsoft-com:office:powerpoint" xmlns:com="http://schemas.openxmlformats.org/drawingml/2006/compatibility" xmlns:p14="http://schemas.microsoft.com/office/powerpoint/2010/main" xmlns:p15="http://schemas.microsoft.com/office/powerpoint/2012/main" xmlns:ahyp="http://schemas.microsoft.com/office/drawing/2018/hyperlinkcolor">
   <p:cSld>
     <p:spTree>
       <p:nvGrpSpPr>
-        <p:cNvPr id="370" name="Shape 370"/>
+        <p:cNvPr id="393" name="Shape 393"/>
         <p:cNvGrpSpPr/>
         <p:nvPr/>
       </p:nvGrpSpPr>
@@ -16872,7 +17719,7 @@
       </p:grpSpPr>
       <p:sp>
         <p:nvSpPr>
-          <p:cNvPr id="371" name="Google Shape;371;p38"/>
+          <p:cNvPr id="394" name="Google Shape;394;p41"/>
           <p:cNvSpPr txBox="1"/>
           <p:nvPr>
             <p:ph idx="1" type="body"/>
@@ -16934,7 +17781,7 @@
       </p:sp>
       <p:sp>
         <p:nvSpPr>
-          <p:cNvPr id="372" name="Google Shape;372;p38"/>
+          <p:cNvPr id="395" name="Google Shape;395;p41"/>
           <p:cNvSpPr txBox="1"/>
           <p:nvPr>
             <p:ph type="title"/>
@@ -16968,6 +17815,100 @@
             <a:r>
               <a:rPr lang="pt-BR" sz="5420"/>
               <a:t>Como sair de dentro do container?</a:t>
+            </a:r>
+            <a:endParaRPr sz="5420"/>
+          </a:p>
+        </p:txBody>
+      </p:sp>
+      <p:pic>
+        <p:nvPicPr>
+          <p:cNvPr id="396" name="Google Shape;396;p41"/>
+          <p:cNvPicPr preferRelativeResize="0"/>
+          <p:nvPr/>
+        </p:nvPicPr>
+        <p:blipFill>
+          <a:blip r:embed="rId3">
+            <a:alphaModFix/>
+          </a:blip>
+          <a:stretch>
+            <a:fillRect/>
+          </a:stretch>
+        </p:blipFill>
+        <p:spPr>
+          <a:xfrm>
+            <a:off x="0" y="3453648"/>
+            <a:ext cx="9144000" cy="1689852"/>
+          </a:xfrm>
+          <a:prstGeom prst="rect">
+            <a:avLst/>
+          </a:prstGeom>
+          <a:noFill/>
+          <a:ln>
+            <a:noFill/>
+          </a:ln>
+        </p:spPr>
+      </p:pic>
+    </p:spTree>
+  </p:cSld>
+  <p:clrMapOvr>
+    <a:masterClrMapping/>
+  </p:clrMapOvr>
+</p:sld>
+</file>
+
+<file path=ppt/slides/slide3.xml><?xml version="1.0" encoding="utf-8"?>
+<p:sld xmlns:a="http://schemas.openxmlformats.org/drawingml/2006/main" xmlns:r="http://schemas.openxmlformats.org/officeDocument/2006/relationships" xmlns:mc="http://schemas.openxmlformats.org/markup-compatibility/2006" xmlns:mv="urn:schemas-microsoft-com:mac:vml" xmlns:p="http://schemas.openxmlformats.org/presentationml/2006/main" xmlns:c="http://schemas.openxmlformats.org/drawingml/2006/chart" xmlns:dgm="http://schemas.openxmlformats.org/drawingml/2006/diagram" xmlns:o="urn:schemas-microsoft-com:office:office" xmlns:v="urn:schemas-microsoft-com:vml" xmlns:pvml="urn:schemas-microsoft-com:office:powerpoint" xmlns:com="http://schemas.openxmlformats.org/drawingml/2006/compatibility" xmlns:p14="http://schemas.microsoft.com/office/powerpoint/2010/main" xmlns:p15="http://schemas.microsoft.com/office/powerpoint/2012/main" xmlns:ahyp="http://schemas.microsoft.com/office/drawing/2018/hyperlinkcolor">
+  <p:cSld>
+    <p:spTree>
+      <p:nvGrpSpPr>
+        <p:cNvPr id="145" name="Shape 145"/>
+        <p:cNvGrpSpPr/>
+        <p:nvPr/>
+      </p:nvGrpSpPr>
+      <p:grpSpPr>
+        <a:xfrm>
+          <a:off x="0" y="0"/>
+          <a:ext cx="0" cy="0"/>
+          <a:chOff x="0" y="0"/>
+          <a:chExt cx="0" cy="0"/>
+        </a:xfrm>
+      </p:grpSpPr>
+      <p:sp>
+        <p:nvSpPr>
+          <p:cNvPr id="146" name="Google Shape;146;p15"/>
+          <p:cNvSpPr txBox="1"/>
+          <p:nvPr>
+            <p:ph type="title"/>
+          </p:nvPr>
+        </p:nvSpPr>
+        <p:spPr>
+          <a:xfrm>
+            <a:off x="447450" y="2032050"/>
+            <a:ext cx="8249100" cy="1079400"/>
+          </a:xfrm>
+          <a:prstGeom prst="rect">
+            <a:avLst/>
+          </a:prstGeom>
+        </p:spPr>
+        <p:txBody>
+          <a:bodyPr anchorCtr="0" anchor="t" bIns="91425" lIns="91425" spcFirstLastPara="1" rIns="91425" wrap="square" tIns="91425">
+            <a:noAutofit/>
+          </a:bodyPr>
+          <a:lstStyle/>
+          <a:p>
+            <a:pPr indent="0" lvl="0" marL="0" rtl="0" algn="l">
+              <a:spcBef>
+                <a:spcPts val="0"/>
+              </a:spcBef>
+              <a:spcAft>
+                <a:spcPts val="0"/>
+              </a:spcAft>
+              <a:buSzPts val="990"/>
+              <a:buNone/>
+            </a:pPr>
+            <a:r>
+              <a:rPr lang="pt-BR" sz="5420"/>
+              <a:t>Para que serve o Docker?</a:t>
             </a:r>
             <a:endParaRPr sz="5420"/>
           </a:p>
@@ -16981,12 +17922,12 @@
 </p:sld>
 </file>
 
-<file path=ppt/slides/slide27.xml><?xml version="1.0" encoding="utf-8"?>
+<file path=ppt/slides/slide30.xml><?xml version="1.0" encoding="utf-8"?>
 <p:sld xmlns:a="http://schemas.openxmlformats.org/drawingml/2006/main" xmlns:r="http://schemas.openxmlformats.org/officeDocument/2006/relationships" xmlns:mc="http://schemas.openxmlformats.org/markup-compatibility/2006" xmlns:mv="urn:schemas-microsoft-com:mac:vml" xmlns:p="http://schemas.openxmlformats.org/presentationml/2006/main" xmlns:c="http://schemas.openxmlformats.org/drawingml/2006/chart" xmlns:dgm="http://schemas.openxmlformats.org/drawingml/2006/diagram" xmlns:o="urn:schemas-microsoft-com:office:office" xmlns:v="urn:schemas-microsoft-com:vml" xmlns:pvml="urn:schemas-microsoft-com:office:powerpoint" xmlns:com="http://schemas.openxmlformats.org/drawingml/2006/compatibility" xmlns:p14="http://schemas.microsoft.com/office/powerpoint/2010/main" xmlns:p15="http://schemas.microsoft.com/office/powerpoint/2012/main" xmlns:ahyp="http://schemas.microsoft.com/office/drawing/2018/hyperlinkcolor">
   <p:cSld>
     <p:spTree>
       <p:nvGrpSpPr>
-        <p:cNvPr id="376" name="Shape 376"/>
+        <p:cNvPr id="400" name="Shape 400"/>
         <p:cNvGrpSpPr/>
         <p:nvPr/>
       </p:nvGrpSpPr>
@@ -17000,7 +17941,7 @@
       </p:grpSpPr>
       <p:sp>
         <p:nvSpPr>
-          <p:cNvPr id="377" name="Google Shape;377;p39"/>
+          <p:cNvPr id="401" name="Google Shape;401;p42"/>
           <p:cNvSpPr txBox="1"/>
           <p:nvPr>
             <p:ph idx="1" type="body"/>
@@ -17062,7 +18003,7 @@
       </p:sp>
       <p:sp>
         <p:nvSpPr>
-          <p:cNvPr id="378" name="Google Shape;378;p39"/>
+          <p:cNvPr id="402" name="Google Shape;402;p42"/>
           <p:cNvSpPr txBox="1"/>
           <p:nvPr>
             <p:ph type="title"/>
@@ -17101,6 +18042,34 @@
           </a:p>
         </p:txBody>
       </p:sp>
+      <p:pic>
+        <p:nvPicPr>
+          <p:cNvPr id="403" name="Google Shape;403;p42"/>
+          <p:cNvPicPr preferRelativeResize="0"/>
+          <p:nvPr/>
+        </p:nvPicPr>
+        <p:blipFill>
+          <a:blip r:embed="rId3">
+            <a:alphaModFix/>
+          </a:blip>
+          <a:stretch>
+            <a:fillRect/>
+          </a:stretch>
+        </p:blipFill>
+        <p:spPr>
+          <a:xfrm>
+            <a:off x="0" y="3703345"/>
+            <a:ext cx="9144000" cy="1440155"/>
+          </a:xfrm>
+          <a:prstGeom prst="rect">
+            <a:avLst/>
+          </a:prstGeom>
+          <a:noFill/>
+          <a:ln>
+            <a:noFill/>
+          </a:ln>
+        </p:spPr>
+      </p:pic>
     </p:spTree>
   </p:cSld>
   <p:clrMapOvr>
@@ -17109,12 +18078,12 @@
 </p:sld>
 </file>
 
-<file path=ppt/slides/slide28.xml><?xml version="1.0" encoding="utf-8"?>
+<file path=ppt/slides/slide31.xml><?xml version="1.0" encoding="utf-8"?>
 <p:sld xmlns:a="http://schemas.openxmlformats.org/drawingml/2006/main" xmlns:r="http://schemas.openxmlformats.org/officeDocument/2006/relationships" xmlns:mc="http://schemas.openxmlformats.org/markup-compatibility/2006" xmlns:mv="urn:schemas-microsoft-com:mac:vml" xmlns:p="http://schemas.openxmlformats.org/presentationml/2006/main" xmlns:c="http://schemas.openxmlformats.org/drawingml/2006/chart" xmlns:dgm="http://schemas.openxmlformats.org/drawingml/2006/diagram" xmlns:o="urn:schemas-microsoft-com:office:office" xmlns:v="urn:schemas-microsoft-com:vml" xmlns:pvml="urn:schemas-microsoft-com:office:powerpoint" xmlns:com="http://schemas.openxmlformats.org/drawingml/2006/compatibility" xmlns:p14="http://schemas.microsoft.com/office/powerpoint/2010/main" xmlns:p15="http://schemas.microsoft.com/office/powerpoint/2012/main" xmlns:ahyp="http://schemas.microsoft.com/office/drawing/2018/hyperlinkcolor">
   <p:cSld>
     <p:spTree>
       <p:nvGrpSpPr>
-        <p:cNvPr id="382" name="Shape 382"/>
+        <p:cNvPr id="407" name="Shape 407"/>
         <p:cNvGrpSpPr/>
         <p:nvPr/>
       </p:nvGrpSpPr>
@@ -17128,7 +18097,7 @@
       </p:grpSpPr>
       <p:sp>
         <p:nvSpPr>
-          <p:cNvPr id="383" name="Google Shape;383;p40"/>
+          <p:cNvPr id="408" name="Google Shape;408;p43"/>
           <p:cNvSpPr txBox="1"/>
           <p:nvPr>
             <p:ph idx="1" type="body"/>
@@ -17190,7 +18159,7 @@
       </p:sp>
       <p:sp>
         <p:nvSpPr>
-          <p:cNvPr id="384" name="Google Shape;384;p40"/>
+          <p:cNvPr id="409" name="Google Shape;409;p43"/>
           <p:cNvSpPr txBox="1"/>
           <p:nvPr>
             <p:ph type="title"/>
@@ -17229,6 +18198,34 @@
           </a:p>
         </p:txBody>
       </p:sp>
+      <p:pic>
+        <p:nvPicPr>
+          <p:cNvPr id="410" name="Google Shape;410;p43"/>
+          <p:cNvPicPr preferRelativeResize="0"/>
+          <p:nvPr/>
+        </p:nvPicPr>
+        <p:blipFill>
+          <a:blip r:embed="rId3">
+            <a:alphaModFix/>
+          </a:blip>
+          <a:stretch>
+            <a:fillRect/>
+          </a:stretch>
+        </p:blipFill>
+        <p:spPr>
+          <a:xfrm>
+            <a:off x="2" y="3555622"/>
+            <a:ext cx="9143999" cy="1587880"/>
+          </a:xfrm>
+          <a:prstGeom prst="rect">
+            <a:avLst/>
+          </a:prstGeom>
+          <a:noFill/>
+          <a:ln>
+            <a:noFill/>
+          </a:ln>
+        </p:spPr>
+      </p:pic>
     </p:spTree>
   </p:cSld>
   <p:clrMapOvr>
@@ -17237,12 +18234,12 @@
 </p:sld>
 </file>
 
-<file path=ppt/slides/slide29.xml><?xml version="1.0" encoding="utf-8"?>
+<file path=ppt/slides/slide32.xml><?xml version="1.0" encoding="utf-8"?>
 <p:sld xmlns:a="http://schemas.openxmlformats.org/drawingml/2006/main" xmlns:r="http://schemas.openxmlformats.org/officeDocument/2006/relationships" xmlns:mc="http://schemas.openxmlformats.org/markup-compatibility/2006" xmlns:mv="urn:schemas-microsoft-com:mac:vml" xmlns:p="http://schemas.openxmlformats.org/presentationml/2006/main" xmlns:c="http://schemas.openxmlformats.org/drawingml/2006/chart" xmlns:dgm="http://schemas.openxmlformats.org/drawingml/2006/diagram" xmlns:o="urn:schemas-microsoft-com:office:office" xmlns:v="urn:schemas-microsoft-com:vml" xmlns:pvml="urn:schemas-microsoft-com:office:powerpoint" xmlns:com="http://schemas.openxmlformats.org/drawingml/2006/compatibility" xmlns:p14="http://schemas.microsoft.com/office/powerpoint/2010/main" xmlns:p15="http://schemas.microsoft.com/office/powerpoint/2012/main" xmlns:ahyp="http://schemas.microsoft.com/office/drawing/2018/hyperlinkcolor">
   <p:cSld>
     <p:spTree>
       <p:nvGrpSpPr>
-        <p:cNvPr id="388" name="Shape 388"/>
+        <p:cNvPr id="414" name="Shape 414"/>
         <p:cNvGrpSpPr/>
         <p:nvPr/>
       </p:nvGrpSpPr>
@@ -17256,7 +18253,7 @@
       </p:grpSpPr>
       <p:sp>
         <p:nvSpPr>
-          <p:cNvPr id="389" name="Google Shape;389;p41"/>
+          <p:cNvPr id="415" name="Google Shape;415;p44"/>
           <p:cNvSpPr txBox="1"/>
           <p:nvPr>
             <p:ph type="title"/>
@@ -17303,12 +18300,12 @@
 </p:sld>
 </file>
 
-<file path=ppt/slides/slide3.xml><?xml version="1.0" encoding="utf-8"?>
+<file path=ppt/slides/slide33.xml><?xml version="1.0" encoding="utf-8"?>
 <p:sld xmlns:a="http://schemas.openxmlformats.org/drawingml/2006/main" xmlns:r="http://schemas.openxmlformats.org/officeDocument/2006/relationships" xmlns:mc="http://schemas.openxmlformats.org/markup-compatibility/2006" xmlns:mv="urn:schemas-microsoft-com:mac:vml" xmlns:p="http://schemas.openxmlformats.org/presentationml/2006/main" xmlns:c="http://schemas.openxmlformats.org/drawingml/2006/chart" xmlns:dgm="http://schemas.openxmlformats.org/drawingml/2006/diagram" xmlns:o="urn:schemas-microsoft-com:office:office" xmlns:v="urn:schemas-microsoft-com:vml" xmlns:pvml="urn:schemas-microsoft-com:office:powerpoint" xmlns:com="http://schemas.openxmlformats.org/drawingml/2006/compatibility" xmlns:p14="http://schemas.microsoft.com/office/powerpoint/2010/main" xmlns:p15="http://schemas.microsoft.com/office/powerpoint/2012/main" xmlns:ahyp="http://schemas.microsoft.com/office/drawing/2018/hyperlinkcolor">
   <p:cSld>
     <p:spTree>
       <p:nvGrpSpPr>
-        <p:cNvPr id="145" name="Shape 145"/>
+        <p:cNvPr id="419" name="Shape 419"/>
         <p:cNvGrpSpPr/>
         <p:nvPr/>
       </p:nvGrpSpPr>
@@ -17322,7 +18319,7 @@
       </p:grpSpPr>
       <p:sp>
         <p:nvSpPr>
-          <p:cNvPr id="146" name="Google Shape;146;p15"/>
+          <p:cNvPr id="420" name="Google Shape;420;p45"/>
           <p:cNvSpPr txBox="1"/>
           <p:nvPr>
             <p:ph type="title"/>
@@ -17330,8 +18327,8 @@
         </p:nvSpPr>
         <p:spPr>
           <a:xfrm>
-            <a:off x="447450" y="2032050"/>
-            <a:ext cx="8249100" cy="1079400"/>
+            <a:off x="1297500" y="393750"/>
+            <a:ext cx="7038900" cy="914100"/>
           </a:xfrm>
           <a:prstGeom prst="rect">
             <a:avLst/>
@@ -17339,28 +18336,135 @@
         </p:spPr>
         <p:txBody>
           <a:bodyPr anchorCtr="0" anchor="t" bIns="91425" lIns="91425" spcFirstLastPara="1" rIns="91425" wrap="square" tIns="91425">
-            <a:noAutofit/>
+            <a:normAutofit fontScale="90000"/>
           </a:bodyPr>
           <a:lstStyle/>
           <a:p>
-            <a:pPr indent="0" lvl="0" marL="0" rtl="0" algn="l">
-              <a:spcBef>
-                <a:spcPts val="0"/>
-              </a:spcBef>
-              <a:spcAft>
-                <a:spcPts val="0"/>
-              </a:spcAft>
-              <a:buSzPts val="990"/>
+            <a:pPr indent="0" lvl="0" marL="0" rtl="0" algn="ctr">
+              <a:spcBef>
+                <a:spcPts val="0"/>
+              </a:spcBef>
+              <a:spcAft>
+                <a:spcPts val="0"/>
+              </a:spcAft>
+              <a:buClr>
+                <a:schemeClr val="dk1"/>
+              </a:buClr>
+              <a:buSzPct val="45833"/>
+              <a:buFont typeface="Arial"/>
               <a:buNone/>
             </a:pPr>
             <a:r>
-              <a:rPr lang="pt-BR" sz="5420"/>
-              <a:t>Para que serve o Docker?</a:t>
+              <a:rPr lang="pt-BR"/>
+              <a:t>Como criar uma imagem?</a:t>
             </a:r>
-            <a:endParaRPr sz="5420"/>
+            <a:endParaRPr/>
+          </a:p>
+          <a:p>
+            <a:pPr indent="0" lvl="0" marL="0" rtl="0" algn="ctr">
+              <a:spcBef>
+                <a:spcPts val="0"/>
+              </a:spcBef>
+              <a:spcAft>
+                <a:spcPts val="0"/>
+              </a:spcAft>
+              <a:buClr>
+                <a:schemeClr val="dk1"/>
+              </a:buClr>
+              <a:buSzPct val="45833"/>
+              <a:buFont typeface="Arial"/>
+              <a:buNone/>
+            </a:pPr>
+            <a:r>
+              <a:t/>
+            </a:r>
+            <a:endParaRPr/>
+          </a:p>
+          <a:p>
+            <a:pPr indent="0" lvl="0" marL="0" rtl="0" algn="ctr">
+              <a:spcBef>
+                <a:spcPts val="0"/>
+              </a:spcBef>
+              <a:spcAft>
+                <a:spcPts val="0"/>
+              </a:spcAft>
+              <a:buNone/>
+            </a:pPr>
+            <a:r>
+              <a:t/>
+            </a:r>
+            <a:endParaRPr/>
           </a:p>
         </p:txBody>
       </p:sp>
+      <p:sp>
+        <p:nvSpPr>
+          <p:cNvPr id="421" name="Google Shape;421;p45"/>
+          <p:cNvSpPr txBox="1"/>
+          <p:nvPr>
+            <p:ph idx="1" type="body"/>
+          </p:nvPr>
+        </p:nvSpPr>
+        <p:spPr>
+          <a:xfrm>
+            <a:off x="2441850" y="4126950"/>
+            <a:ext cx="4260300" cy="442200"/>
+          </a:xfrm>
+          <a:prstGeom prst="rect">
+            <a:avLst/>
+          </a:prstGeom>
+        </p:spPr>
+        <p:txBody>
+          <a:bodyPr anchorCtr="0" anchor="t" bIns="91425" lIns="91425" spcFirstLastPara="1" rIns="91425" wrap="square" tIns="91425">
+            <a:normAutofit/>
+          </a:bodyPr>
+          <a:lstStyle/>
+          <a:p>
+            <a:pPr indent="0" lvl="0" marL="0" rtl="0" algn="ctr">
+              <a:spcBef>
+                <a:spcPts val="0"/>
+              </a:spcBef>
+              <a:spcAft>
+                <a:spcPts val="1200"/>
+              </a:spcAft>
+              <a:buNone/>
+            </a:pPr>
+            <a:r>
+              <a:rPr lang="pt-BR"/>
+              <a:t>dockerfile</a:t>
+            </a:r>
+            <a:endParaRPr/>
+          </a:p>
+        </p:txBody>
+      </p:sp>
+      <p:pic>
+        <p:nvPicPr>
+          <p:cNvPr id="422" name="Google Shape;422;p45" title="dockerfile.png"/>
+          <p:cNvPicPr preferRelativeResize="0"/>
+          <p:nvPr/>
+        </p:nvPicPr>
+        <p:blipFill>
+          <a:blip r:embed="rId3">
+            <a:alphaModFix/>
+          </a:blip>
+          <a:stretch>
+            <a:fillRect/>
+          </a:stretch>
+        </p:blipFill>
+        <p:spPr>
+          <a:xfrm>
+            <a:off x="3169788" y="1322525"/>
+            <a:ext cx="2804425" cy="2804425"/>
+          </a:xfrm>
+          <a:prstGeom prst="rect">
+            <a:avLst/>
+          </a:prstGeom>
+          <a:noFill/>
+          <a:ln>
+            <a:noFill/>
+          </a:ln>
+        </p:spPr>
+      </p:pic>
     </p:spTree>
   </p:cSld>
   <p:clrMapOvr>
@@ -17369,12 +18473,12 @@
 </p:sld>
 </file>
 
-<file path=ppt/slides/slide30.xml><?xml version="1.0" encoding="utf-8"?>
+<file path=ppt/slides/slide34.xml><?xml version="1.0" encoding="utf-8"?>
 <p:sld xmlns:a="http://schemas.openxmlformats.org/drawingml/2006/main" xmlns:r="http://schemas.openxmlformats.org/officeDocument/2006/relationships" xmlns:mc="http://schemas.openxmlformats.org/markup-compatibility/2006" xmlns:mv="urn:schemas-microsoft-com:mac:vml" xmlns:p="http://schemas.openxmlformats.org/presentationml/2006/main" xmlns:c="http://schemas.openxmlformats.org/drawingml/2006/chart" xmlns:dgm="http://schemas.openxmlformats.org/drawingml/2006/diagram" xmlns:o="urn:schemas-microsoft-com:office:office" xmlns:v="urn:schemas-microsoft-com:vml" xmlns:pvml="urn:schemas-microsoft-com:office:powerpoint" xmlns:com="http://schemas.openxmlformats.org/drawingml/2006/compatibility" xmlns:p14="http://schemas.microsoft.com/office/powerpoint/2010/main" xmlns:p15="http://schemas.microsoft.com/office/powerpoint/2012/main" xmlns:ahyp="http://schemas.microsoft.com/office/drawing/2018/hyperlinkcolor">
   <p:cSld>
     <p:spTree>
       <p:nvGrpSpPr>
-        <p:cNvPr id="393" name="Shape 393"/>
+        <p:cNvPr id="426" name="Shape 426"/>
         <p:cNvGrpSpPr/>
         <p:nvPr/>
       </p:nvGrpSpPr>
@@ -17388,7 +18492,7 @@
       </p:grpSpPr>
       <p:sp>
         <p:nvSpPr>
-          <p:cNvPr id="394" name="Google Shape;394;p42"/>
+          <p:cNvPr id="427" name="Google Shape;427;p46"/>
           <p:cNvSpPr txBox="1"/>
           <p:nvPr>
             <p:ph type="title"/>
@@ -17398,86 +18502,6 @@
           <a:xfrm>
             <a:off x="1297500" y="393750"/>
             <a:ext cx="7038900" cy="914100"/>
-          </a:xfrm>
-          <a:prstGeom prst="rect">
-            <a:avLst/>
-          </a:prstGeom>
-        </p:spPr>
-        <p:txBody>
-          <a:bodyPr anchorCtr="0" anchor="t" bIns="91425" lIns="91425" spcFirstLastPara="1" rIns="91425" wrap="square" tIns="91425">
-            <a:normAutofit fontScale="90000"/>
-          </a:bodyPr>
-          <a:lstStyle/>
-          <a:p>
-            <a:pPr indent="0" lvl="0" marL="0" rtl="0" algn="ctr">
-              <a:spcBef>
-                <a:spcPts val="0"/>
-              </a:spcBef>
-              <a:spcAft>
-                <a:spcPts val="0"/>
-              </a:spcAft>
-              <a:buClr>
-                <a:schemeClr val="dk1"/>
-              </a:buClr>
-              <a:buSzPct val="45833"/>
-              <a:buFont typeface="Arial"/>
-              <a:buNone/>
-            </a:pPr>
-            <a:r>
-              <a:rPr lang="pt-BR"/>
-              <a:t>Como criar um container?</a:t>
-            </a:r>
-            <a:endParaRPr/>
-          </a:p>
-          <a:p>
-            <a:pPr indent="0" lvl="0" marL="0" rtl="0" algn="ctr">
-              <a:spcBef>
-                <a:spcPts val="0"/>
-              </a:spcBef>
-              <a:spcAft>
-                <a:spcPts val="0"/>
-              </a:spcAft>
-              <a:buClr>
-                <a:schemeClr val="dk1"/>
-              </a:buClr>
-              <a:buSzPct val="45833"/>
-              <a:buFont typeface="Arial"/>
-              <a:buNone/>
-            </a:pPr>
-            <a:r>
-              <a:t/>
-            </a:r>
-            <a:endParaRPr/>
-          </a:p>
-          <a:p>
-            <a:pPr indent="0" lvl="0" marL="0" rtl="0" algn="ctr">
-              <a:spcBef>
-                <a:spcPts val="0"/>
-              </a:spcBef>
-              <a:spcAft>
-                <a:spcPts val="0"/>
-              </a:spcAft>
-              <a:buNone/>
-            </a:pPr>
-            <a:r>
-              <a:t/>
-            </a:r>
-            <a:endParaRPr/>
-          </a:p>
-        </p:txBody>
-      </p:sp>
-      <p:sp>
-        <p:nvSpPr>
-          <p:cNvPr id="395" name="Google Shape;395;p42"/>
-          <p:cNvSpPr txBox="1"/>
-          <p:nvPr>
-            <p:ph idx="1" type="body"/>
-          </p:nvPr>
-        </p:nvSpPr>
-        <p:spPr>
-          <a:xfrm>
-            <a:off x="2441850" y="4126950"/>
-            <a:ext cx="4260300" cy="442200"/>
           </a:xfrm>
           <a:prstGeom prst="rect">
             <a:avLst/>
@@ -17494,7 +18518,7 @@
                 <a:spcPts val="0"/>
               </a:spcBef>
               <a:spcAft>
-                <a:spcPts val="1200"/>
+                <a:spcPts val="0"/>
               </a:spcAft>
               <a:buNone/>
             </a:pPr>
@@ -17508,7 +18532,7 @@
       </p:sp>
       <p:pic>
         <p:nvPicPr>
-          <p:cNvPr id="396" name="Google Shape;396;p42" title="dockerfile.png"/>
+          <p:cNvPr id="428" name="Google Shape;428;p46"/>
           <p:cNvPicPr preferRelativeResize="0"/>
           <p:nvPr/>
         </p:nvPicPr>
@@ -17522,8 +18546,8 @@
         </p:blipFill>
         <p:spPr>
           <a:xfrm>
-            <a:off x="3169788" y="1322525"/>
-            <a:ext cx="2804425" cy="2804425"/>
+            <a:off x="0" y="1368975"/>
+            <a:ext cx="9143999" cy="3037600"/>
           </a:xfrm>
           <a:prstGeom prst="rect">
             <a:avLst/>
@@ -17542,12 +18566,12 @@
 </p:sld>
 </file>
 
-<file path=ppt/slides/slide31.xml><?xml version="1.0" encoding="utf-8"?>
+<file path=ppt/slides/slide35.xml><?xml version="1.0" encoding="utf-8"?>
 <p:sld xmlns:a="http://schemas.openxmlformats.org/drawingml/2006/main" xmlns:r="http://schemas.openxmlformats.org/officeDocument/2006/relationships" xmlns:mc="http://schemas.openxmlformats.org/markup-compatibility/2006" xmlns:mv="urn:schemas-microsoft-com:mac:vml" xmlns:p="http://schemas.openxmlformats.org/presentationml/2006/main" xmlns:c="http://schemas.openxmlformats.org/drawingml/2006/chart" xmlns:dgm="http://schemas.openxmlformats.org/drawingml/2006/diagram" xmlns:o="urn:schemas-microsoft-com:office:office" xmlns:v="urn:schemas-microsoft-com:vml" xmlns:pvml="urn:schemas-microsoft-com:office:powerpoint" xmlns:com="http://schemas.openxmlformats.org/drawingml/2006/compatibility" xmlns:p14="http://schemas.microsoft.com/office/powerpoint/2010/main" xmlns:p15="http://schemas.microsoft.com/office/powerpoint/2012/main" xmlns:ahyp="http://schemas.microsoft.com/office/drawing/2018/hyperlinkcolor">
   <p:cSld>
     <p:spTree>
       <p:nvGrpSpPr>
-        <p:cNvPr id="400" name="Shape 400"/>
+        <p:cNvPr id="432" name="Shape 432"/>
         <p:cNvGrpSpPr/>
         <p:nvPr/>
       </p:nvGrpSpPr>
@@ -17561,100 +18585,7 @@
       </p:grpSpPr>
       <p:sp>
         <p:nvSpPr>
-          <p:cNvPr id="401" name="Google Shape;401;p43"/>
-          <p:cNvSpPr txBox="1"/>
-          <p:nvPr>
-            <p:ph type="title"/>
-          </p:nvPr>
-        </p:nvSpPr>
-        <p:spPr>
-          <a:xfrm>
-            <a:off x="1297500" y="393750"/>
-            <a:ext cx="7038900" cy="914100"/>
-          </a:xfrm>
-          <a:prstGeom prst="rect">
-            <a:avLst/>
-          </a:prstGeom>
-        </p:spPr>
-        <p:txBody>
-          <a:bodyPr anchorCtr="0" anchor="t" bIns="91425" lIns="91425" spcFirstLastPara="1" rIns="91425" wrap="square" tIns="91425">
-            <a:normAutofit/>
-          </a:bodyPr>
-          <a:lstStyle/>
-          <a:p>
-            <a:pPr indent="0" lvl="0" marL="0" rtl="0" algn="ctr">
-              <a:spcBef>
-                <a:spcPts val="0"/>
-              </a:spcBef>
-              <a:spcAft>
-                <a:spcPts val="0"/>
-              </a:spcAft>
-              <a:buNone/>
-            </a:pPr>
-            <a:r>
-              <a:rPr lang="pt-BR"/>
-              <a:t>dockerfile</a:t>
-            </a:r>
-            <a:endParaRPr/>
-          </a:p>
-        </p:txBody>
-      </p:sp>
-      <p:pic>
-        <p:nvPicPr>
-          <p:cNvPr id="402" name="Google Shape;402;p43"/>
-          <p:cNvPicPr preferRelativeResize="0"/>
-          <p:nvPr/>
-        </p:nvPicPr>
-        <p:blipFill>
-          <a:blip r:embed="rId3">
-            <a:alphaModFix/>
-          </a:blip>
-          <a:stretch>
-            <a:fillRect/>
-          </a:stretch>
-        </p:blipFill>
-        <p:spPr>
-          <a:xfrm>
-            <a:off x="0" y="1368975"/>
-            <a:ext cx="9143999" cy="3037600"/>
-          </a:xfrm>
-          <a:prstGeom prst="rect">
-            <a:avLst/>
-          </a:prstGeom>
-          <a:noFill/>
-          <a:ln>
-            <a:noFill/>
-          </a:ln>
-        </p:spPr>
-      </p:pic>
-    </p:spTree>
-  </p:cSld>
-  <p:clrMapOvr>
-    <a:masterClrMapping/>
-  </p:clrMapOvr>
-</p:sld>
-</file>
-
-<file path=ppt/slides/slide32.xml><?xml version="1.0" encoding="utf-8"?>
-<p:sld xmlns:a="http://schemas.openxmlformats.org/drawingml/2006/main" xmlns:r="http://schemas.openxmlformats.org/officeDocument/2006/relationships" xmlns:mc="http://schemas.openxmlformats.org/markup-compatibility/2006" xmlns:mv="urn:schemas-microsoft-com:mac:vml" xmlns:p="http://schemas.openxmlformats.org/presentationml/2006/main" xmlns:c="http://schemas.openxmlformats.org/drawingml/2006/chart" xmlns:dgm="http://schemas.openxmlformats.org/drawingml/2006/diagram" xmlns:o="urn:schemas-microsoft-com:office:office" xmlns:v="urn:schemas-microsoft-com:vml" xmlns:pvml="urn:schemas-microsoft-com:office:powerpoint" xmlns:com="http://schemas.openxmlformats.org/drawingml/2006/compatibility" xmlns:p14="http://schemas.microsoft.com/office/powerpoint/2010/main" xmlns:p15="http://schemas.microsoft.com/office/powerpoint/2012/main" xmlns:ahyp="http://schemas.microsoft.com/office/drawing/2018/hyperlinkcolor">
-  <p:cSld>
-    <p:spTree>
-      <p:nvGrpSpPr>
-        <p:cNvPr id="406" name="Shape 406"/>
-        <p:cNvGrpSpPr/>
-        <p:nvPr/>
-      </p:nvGrpSpPr>
-      <p:grpSpPr>
-        <a:xfrm>
-          <a:off x="0" y="0"/>
-          <a:ext cx="0" cy="0"/>
-          <a:chOff x="0" y="0"/>
-          <a:chExt cx="0" cy="0"/>
-        </a:xfrm>
-      </p:grpSpPr>
-      <p:sp>
-        <p:nvSpPr>
-          <p:cNvPr id="407" name="Google Shape;407;p44"/>
+          <p:cNvPr id="433" name="Google Shape;433;p47"/>
           <p:cNvSpPr txBox="1"/>
           <p:nvPr>
             <p:ph idx="1" type="body"/>
@@ -17662,7 +18593,7 @@
         </p:nvSpPr>
         <p:spPr>
           <a:xfrm>
-            <a:off x="311700" y="2493850"/>
+            <a:off x="347175" y="2040600"/>
             <a:ext cx="8520600" cy="2422500"/>
           </a:xfrm>
           <a:prstGeom prst="rect">
@@ -17716,7 +18647,7 @@
       </p:sp>
       <p:sp>
         <p:nvSpPr>
-          <p:cNvPr id="408" name="Google Shape;408;p44"/>
+          <p:cNvPr id="434" name="Google Shape;434;p47"/>
           <p:cNvSpPr txBox="1"/>
           <p:nvPr>
             <p:ph type="title"/>
@@ -17724,7 +18655,7 @@
         </p:nvSpPr>
         <p:spPr>
           <a:xfrm>
-            <a:off x="447450" y="453250"/>
+            <a:off x="447450" y="0"/>
             <a:ext cx="8249100" cy="2040600"/>
           </a:xfrm>
           <a:prstGeom prst="rect">
@@ -17749,12 +18680,68 @@
             </a:pPr>
             <a:r>
               <a:rPr lang="pt-BR" sz="5420"/>
-              <a:t>Como construir a imagem docker?</a:t>
+              <a:t>Como construir a imagem Docker?</a:t>
             </a:r>
             <a:endParaRPr sz="5420"/>
           </a:p>
         </p:txBody>
       </p:sp>
+      <p:pic>
+        <p:nvPicPr>
+          <p:cNvPr id="435" name="Google Shape;435;p47"/>
+          <p:cNvPicPr preferRelativeResize="0"/>
+          <p:nvPr/>
+        </p:nvPicPr>
+        <p:blipFill>
+          <a:blip r:embed="rId3">
+            <a:alphaModFix/>
+          </a:blip>
+          <a:stretch>
+            <a:fillRect/>
+          </a:stretch>
+        </p:blipFill>
+        <p:spPr>
+          <a:xfrm>
+            <a:off x="0" y="2685175"/>
+            <a:ext cx="5990800" cy="2458325"/>
+          </a:xfrm>
+          <a:prstGeom prst="rect">
+            <a:avLst/>
+          </a:prstGeom>
+          <a:noFill/>
+          <a:ln>
+            <a:noFill/>
+          </a:ln>
+        </p:spPr>
+      </p:pic>
+      <p:pic>
+        <p:nvPicPr>
+          <p:cNvPr id="436" name="Google Shape;436;p47"/>
+          <p:cNvPicPr preferRelativeResize="0"/>
+          <p:nvPr/>
+        </p:nvPicPr>
+        <p:blipFill>
+          <a:blip r:embed="rId4">
+            <a:alphaModFix/>
+          </a:blip>
+          <a:stretch>
+            <a:fillRect/>
+          </a:stretch>
+        </p:blipFill>
+        <p:spPr>
+          <a:xfrm>
+            <a:off x="5990800" y="4463100"/>
+            <a:ext cx="3153200" cy="680400"/>
+          </a:xfrm>
+          <a:prstGeom prst="rect">
+            <a:avLst/>
+          </a:prstGeom>
+          <a:noFill/>
+          <a:ln>
+            <a:noFill/>
+          </a:ln>
+        </p:spPr>
+      </p:pic>
     </p:spTree>
   </p:cSld>
   <p:clrMapOvr>
@@ -17763,12 +18750,12 @@
 </p:sld>
 </file>
 
-<file path=ppt/slides/slide33.xml><?xml version="1.0" encoding="utf-8"?>
+<file path=ppt/slides/slide36.xml><?xml version="1.0" encoding="utf-8"?>
 <p:sld xmlns:a="http://schemas.openxmlformats.org/drawingml/2006/main" xmlns:r="http://schemas.openxmlformats.org/officeDocument/2006/relationships" xmlns:mc="http://schemas.openxmlformats.org/markup-compatibility/2006" xmlns:mv="urn:schemas-microsoft-com:mac:vml" xmlns:p="http://schemas.openxmlformats.org/presentationml/2006/main" xmlns:c="http://schemas.openxmlformats.org/drawingml/2006/chart" xmlns:dgm="http://schemas.openxmlformats.org/drawingml/2006/diagram" xmlns:o="urn:schemas-microsoft-com:office:office" xmlns:v="urn:schemas-microsoft-com:vml" xmlns:pvml="urn:schemas-microsoft-com:office:powerpoint" xmlns:com="http://schemas.openxmlformats.org/drawingml/2006/compatibility" xmlns:p14="http://schemas.microsoft.com/office/powerpoint/2010/main" xmlns:p15="http://schemas.microsoft.com/office/powerpoint/2012/main" xmlns:ahyp="http://schemas.microsoft.com/office/drawing/2018/hyperlinkcolor">
   <p:cSld>
     <p:spTree>
       <p:nvGrpSpPr>
-        <p:cNvPr id="412" name="Shape 412"/>
+        <p:cNvPr id="440" name="Shape 440"/>
         <p:cNvGrpSpPr/>
         <p:nvPr/>
       </p:nvGrpSpPr>
@@ -17782,7 +18769,7 @@
       </p:grpSpPr>
       <p:sp>
         <p:nvSpPr>
-          <p:cNvPr id="413" name="Google Shape;413;p45"/>
+          <p:cNvPr id="441" name="Google Shape;441;p48"/>
           <p:cNvSpPr txBox="1"/>
           <p:nvPr>
             <p:ph idx="1" type="body"/>
@@ -17844,7 +18831,7 @@
       </p:sp>
       <p:sp>
         <p:nvSpPr>
-          <p:cNvPr id="414" name="Google Shape;414;p45"/>
+          <p:cNvPr id="442" name="Google Shape;442;p48"/>
           <p:cNvSpPr txBox="1"/>
           <p:nvPr>
             <p:ph type="title"/>
@@ -17885,7 +18872,7 @@
       </p:sp>
       <p:pic>
         <p:nvPicPr>
-          <p:cNvPr id="415" name="Google Shape;415;p45"/>
+          <p:cNvPr id="443" name="Google Shape;443;p48"/>
           <p:cNvPicPr preferRelativeResize="0"/>
           <p:nvPr/>
         </p:nvPicPr>
@@ -17918,12 +18905,12 @@
 </p:sld>
 </file>
 
-<file path=ppt/slides/slide34.xml><?xml version="1.0" encoding="utf-8"?>
+<file path=ppt/slides/slide37.xml><?xml version="1.0" encoding="utf-8"?>
 <p:sld xmlns:a="http://schemas.openxmlformats.org/drawingml/2006/main" xmlns:r="http://schemas.openxmlformats.org/officeDocument/2006/relationships" xmlns:mc="http://schemas.openxmlformats.org/markup-compatibility/2006" xmlns:mv="urn:schemas-microsoft-com:mac:vml" xmlns:p="http://schemas.openxmlformats.org/presentationml/2006/main" xmlns:c="http://schemas.openxmlformats.org/drawingml/2006/chart" xmlns:dgm="http://schemas.openxmlformats.org/drawingml/2006/diagram" xmlns:o="urn:schemas-microsoft-com:office:office" xmlns:v="urn:schemas-microsoft-com:vml" xmlns:pvml="urn:schemas-microsoft-com:office:powerpoint" xmlns:com="http://schemas.openxmlformats.org/drawingml/2006/compatibility" xmlns:p14="http://schemas.microsoft.com/office/powerpoint/2010/main" xmlns:p15="http://schemas.microsoft.com/office/powerpoint/2012/main" xmlns:ahyp="http://schemas.microsoft.com/office/drawing/2018/hyperlinkcolor">
   <p:cSld>
     <p:spTree>
       <p:nvGrpSpPr>
-        <p:cNvPr id="419" name="Shape 419"/>
+        <p:cNvPr id="447" name="Shape 447"/>
         <p:cNvGrpSpPr/>
         <p:nvPr/>
       </p:nvGrpSpPr>
@@ -17937,7 +18924,7 @@
       </p:grpSpPr>
       <p:sp>
         <p:nvSpPr>
-          <p:cNvPr id="420" name="Google Shape;420;p46"/>
+          <p:cNvPr id="448" name="Google Shape;448;p49"/>
           <p:cNvSpPr txBox="1"/>
           <p:nvPr>
             <p:ph type="title"/>
@@ -17984,12 +18971,12 @@
 </p:sld>
 </file>
 
-<file path=ppt/slides/slide35.xml><?xml version="1.0" encoding="utf-8"?>
+<file path=ppt/slides/slide38.xml><?xml version="1.0" encoding="utf-8"?>
 <p:sld xmlns:a="http://schemas.openxmlformats.org/drawingml/2006/main" xmlns:r="http://schemas.openxmlformats.org/officeDocument/2006/relationships" xmlns:mc="http://schemas.openxmlformats.org/markup-compatibility/2006" xmlns:mv="urn:schemas-microsoft-com:mac:vml" xmlns:p="http://schemas.openxmlformats.org/presentationml/2006/main" xmlns:c="http://schemas.openxmlformats.org/drawingml/2006/chart" xmlns:dgm="http://schemas.openxmlformats.org/drawingml/2006/diagram" xmlns:o="urn:schemas-microsoft-com:office:office" xmlns:v="urn:schemas-microsoft-com:vml" xmlns:pvml="urn:schemas-microsoft-com:office:powerpoint" xmlns:com="http://schemas.openxmlformats.org/drawingml/2006/compatibility" xmlns:p14="http://schemas.microsoft.com/office/powerpoint/2010/main" xmlns:p15="http://schemas.microsoft.com/office/powerpoint/2012/main" xmlns:ahyp="http://schemas.microsoft.com/office/drawing/2018/hyperlinkcolor">
   <p:cSld>
     <p:spTree>
       <p:nvGrpSpPr>
-        <p:cNvPr id="424" name="Shape 424"/>
+        <p:cNvPr id="452" name="Shape 452"/>
         <p:cNvGrpSpPr/>
         <p:nvPr/>
       </p:nvGrpSpPr>
@@ -18003,7 +18990,7 @@
       </p:grpSpPr>
       <p:sp>
         <p:nvSpPr>
-          <p:cNvPr id="425" name="Google Shape;425;p47"/>
+          <p:cNvPr id="453" name="Google Shape;453;p50"/>
           <p:cNvSpPr txBox="1"/>
           <p:nvPr>
             <p:ph idx="1" type="body"/>
@@ -18043,7 +19030,7 @@
       </p:sp>
       <p:sp>
         <p:nvSpPr>
-          <p:cNvPr id="426" name="Google Shape;426;p47"/>
+          <p:cNvPr id="454" name="Google Shape;454;p50"/>
           <p:cNvSpPr txBox="1"/>
           <p:nvPr>
             <p:ph type="title"/>
@@ -18107,12 +19094,12 @@
 </p:sld>
 </file>
 
-<file path=ppt/slides/slide36.xml><?xml version="1.0" encoding="utf-8"?>
+<file path=ppt/slides/slide39.xml><?xml version="1.0" encoding="utf-8"?>
 <p:sld xmlns:a="http://schemas.openxmlformats.org/drawingml/2006/main" xmlns:r="http://schemas.openxmlformats.org/officeDocument/2006/relationships" xmlns:mc="http://schemas.openxmlformats.org/markup-compatibility/2006" xmlns:mv="urn:schemas-microsoft-com:mac:vml" xmlns:p="http://schemas.openxmlformats.org/presentationml/2006/main" xmlns:c="http://schemas.openxmlformats.org/drawingml/2006/chart" xmlns:dgm="http://schemas.openxmlformats.org/drawingml/2006/diagram" xmlns:o="urn:schemas-microsoft-com:office:office" xmlns:v="urn:schemas-microsoft-com:vml" xmlns:pvml="urn:schemas-microsoft-com:office:powerpoint" xmlns:com="http://schemas.openxmlformats.org/drawingml/2006/compatibility" xmlns:p14="http://schemas.microsoft.com/office/powerpoint/2010/main" xmlns:p15="http://schemas.microsoft.com/office/powerpoint/2012/main" xmlns:ahyp="http://schemas.microsoft.com/office/drawing/2018/hyperlinkcolor">
   <p:cSld>
     <p:spTree>
       <p:nvGrpSpPr>
-        <p:cNvPr id="430" name="Shape 430"/>
+        <p:cNvPr id="458" name="Shape 458"/>
         <p:cNvGrpSpPr/>
         <p:nvPr/>
       </p:nvGrpSpPr>
@@ -18126,7 +19113,7 @@
       </p:grpSpPr>
       <p:sp>
         <p:nvSpPr>
-          <p:cNvPr id="431" name="Google Shape;431;p48"/>
+          <p:cNvPr id="459" name="Google Shape;459;p51"/>
           <p:cNvSpPr txBox="1"/>
           <p:nvPr>
             <p:ph type="title"/>
@@ -18166,7 +19153,7 @@
       </p:sp>
       <p:pic>
         <p:nvPicPr>
-          <p:cNvPr id="432" name="Google Shape;432;p48"/>
+          <p:cNvPr id="460" name="Google Shape;460;p51"/>
           <p:cNvPicPr preferRelativeResize="0"/>
           <p:nvPr/>
         </p:nvPicPr>
@@ -18200,12 +19187,65 @@
 </p:sld>
 </file>
 
-<file path=ppt/slides/slide37.xml><?xml version="1.0" encoding="utf-8"?>
+<file path=ppt/slides/slide4.xml><?xml version="1.0" encoding="utf-8"?>
 <p:sld xmlns:a="http://schemas.openxmlformats.org/drawingml/2006/main" xmlns:r="http://schemas.openxmlformats.org/officeDocument/2006/relationships" xmlns:mc="http://schemas.openxmlformats.org/markup-compatibility/2006" xmlns:mv="urn:schemas-microsoft-com:mac:vml" xmlns:p="http://schemas.openxmlformats.org/presentationml/2006/main" xmlns:c="http://schemas.openxmlformats.org/drawingml/2006/chart" xmlns:dgm="http://schemas.openxmlformats.org/drawingml/2006/diagram" xmlns:o="urn:schemas-microsoft-com:office:office" xmlns:v="urn:schemas-microsoft-com:vml" xmlns:pvml="urn:schemas-microsoft-com:office:powerpoint" xmlns:com="http://schemas.openxmlformats.org/drawingml/2006/compatibility" xmlns:p14="http://schemas.microsoft.com/office/powerpoint/2010/main" xmlns:p15="http://schemas.microsoft.com/office/powerpoint/2012/main" xmlns:ahyp="http://schemas.microsoft.com/office/drawing/2018/hyperlinkcolor">
   <p:cSld>
     <p:spTree>
       <p:nvGrpSpPr>
-        <p:cNvPr id="436" name="Shape 436"/>
+        <p:cNvPr id="150" name="Shape 150"/>
+        <p:cNvGrpSpPr/>
+        <p:nvPr/>
+      </p:nvGrpSpPr>
+      <p:grpSpPr>
+        <a:xfrm>
+          <a:off x="0" y="0"/>
+          <a:ext cx="0" cy="0"/>
+          <a:chOff x="0" y="0"/>
+          <a:chExt cx="0" cy="0"/>
+        </a:xfrm>
+      </p:grpSpPr>
+      <p:pic>
+        <p:nvPicPr>
+          <p:cNvPr id="151" name="Google Shape;151;p16" title="image-1.png"/>
+          <p:cNvPicPr preferRelativeResize="0"/>
+          <p:nvPr/>
+        </p:nvPicPr>
+        <p:blipFill>
+          <a:blip r:embed="rId3">
+            <a:alphaModFix/>
+          </a:blip>
+          <a:stretch>
+            <a:fillRect/>
+          </a:stretch>
+        </p:blipFill>
+        <p:spPr>
+          <a:xfrm>
+            <a:off x="2216875" y="216625"/>
+            <a:ext cx="4710250" cy="4710250"/>
+          </a:xfrm>
+          <a:prstGeom prst="rect">
+            <a:avLst/>
+          </a:prstGeom>
+          <a:noFill/>
+          <a:ln>
+            <a:noFill/>
+          </a:ln>
+        </p:spPr>
+      </p:pic>
+    </p:spTree>
+  </p:cSld>
+  <p:clrMapOvr>
+    <a:masterClrMapping/>
+  </p:clrMapOvr>
+</p:sld>
+</file>
+
+<file path=ppt/slides/slide40.xml><?xml version="1.0" encoding="utf-8"?>
+<p:sld xmlns:a="http://schemas.openxmlformats.org/drawingml/2006/main" xmlns:r="http://schemas.openxmlformats.org/officeDocument/2006/relationships" xmlns:mc="http://schemas.openxmlformats.org/markup-compatibility/2006" xmlns:mv="urn:schemas-microsoft-com:mac:vml" xmlns:p="http://schemas.openxmlformats.org/presentationml/2006/main" xmlns:c="http://schemas.openxmlformats.org/drawingml/2006/chart" xmlns:dgm="http://schemas.openxmlformats.org/drawingml/2006/diagram" xmlns:o="urn:schemas-microsoft-com:office:office" xmlns:v="urn:schemas-microsoft-com:vml" xmlns:pvml="urn:schemas-microsoft-com:office:powerpoint" xmlns:com="http://schemas.openxmlformats.org/drawingml/2006/compatibility" xmlns:p14="http://schemas.microsoft.com/office/powerpoint/2010/main" xmlns:p15="http://schemas.microsoft.com/office/powerpoint/2012/main" xmlns:ahyp="http://schemas.microsoft.com/office/drawing/2018/hyperlinkcolor">
+  <p:cSld>
+    <p:spTree>
+      <p:nvGrpSpPr>
+        <p:cNvPr id="464" name="Shape 464"/>
         <p:cNvGrpSpPr/>
         <p:nvPr/>
       </p:nvGrpSpPr>
@@ -18219,7 +19259,7 @@
       </p:grpSpPr>
       <p:sp>
         <p:nvSpPr>
-          <p:cNvPr id="437" name="Google Shape;437;p49"/>
+          <p:cNvPr id="465" name="Google Shape;465;p52"/>
           <p:cNvSpPr txBox="1"/>
           <p:nvPr>
             <p:ph idx="1" type="body"/>
@@ -18281,7 +19321,7 @@
       </p:sp>
       <p:sp>
         <p:nvSpPr>
-          <p:cNvPr id="438" name="Google Shape;438;p49"/>
+          <p:cNvPr id="466" name="Google Shape;466;p52"/>
           <p:cNvSpPr txBox="1"/>
           <p:nvPr>
             <p:ph type="title"/>
@@ -18314,7 +19354,15 @@
             </a:pPr>
             <a:r>
               <a:rPr lang="pt-BR" sz="5420"/>
-              <a:t>Como executar o docker compose?</a:t>
+              <a:t>Como executar o </a:t>
+            </a:r>
+            <a:r>
+              <a:rPr lang="pt-BR" sz="5420"/>
+              <a:t>Docker Compose</a:t>
+            </a:r>
+            <a:r>
+              <a:rPr lang="pt-BR" sz="5420"/>
+              <a:t>?</a:t>
             </a:r>
             <a:endParaRPr sz="5420"/>
           </a:p>
@@ -18328,12 +19376,12 @@
 </p:sld>
 </file>
 
-<file path=ppt/slides/slide38.xml><?xml version="1.0" encoding="utf-8"?>
+<file path=ppt/slides/slide41.xml><?xml version="1.0" encoding="utf-8"?>
 <p:sld xmlns:a="http://schemas.openxmlformats.org/drawingml/2006/main" xmlns:r="http://schemas.openxmlformats.org/officeDocument/2006/relationships" xmlns:mc="http://schemas.openxmlformats.org/markup-compatibility/2006" xmlns:mv="urn:schemas-microsoft-com:mac:vml" xmlns:p="http://schemas.openxmlformats.org/presentationml/2006/main" xmlns:c="http://schemas.openxmlformats.org/drawingml/2006/chart" xmlns:dgm="http://schemas.openxmlformats.org/drawingml/2006/diagram" xmlns:o="urn:schemas-microsoft-com:office:office" xmlns:v="urn:schemas-microsoft-com:vml" xmlns:pvml="urn:schemas-microsoft-com:office:powerpoint" xmlns:com="http://schemas.openxmlformats.org/drawingml/2006/compatibility" xmlns:p14="http://schemas.microsoft.com/office/powerpoint/2010/main" xmlns:p15="http://schemas.microsoft.com/office/powerpoint/2012/main" xmlns:ahyp="http://schemas.microsoft.com/office/drawing/2018/hyperlinkcolor">
   <p:cSld>
     <p:spTree>
       <p:nvGrpSpPr>
-        <p:cNvPr id="442" name="Shape 442"/>
+        <p:cNvPr id="470" name="Shape 470"/>
         <p:cNvGrpSpPr/>
         <p:nvPr/>
       </p:nvGrpSpPr>
@@ -18347,7 +19395,7 @@
       </p:grpSpPr>
       <p:sp>
         <p:nvSpPr>
-          <p:cNvPr id="443" name="Google Shape;443;p50"/>
+          <p:cNvPr id="471" name="Google Shape;471;p53"/>
           <p:cNvSpPr txBox="1"/>
           <p:nvPr>
             <p:ph idx="1" type="body"/>
@@ -18409,7 +19457,7 @@
       </p:sp>
       <p:sp>
         <p:nvSpPr>
-          <p:cNvPr id="444" name="Google Shape;444;p50"/>
+          <p:cNvPr id="472" name="Google Shape;472;p53"/>
           <p:cNvSpPr txBox="1"/>
           <p:nvPr>
             <p:ph type="title"/>
@@ -18459,7 +19507,7 @@
             </a:pPr>
             <a:r>
               <a:rPr lang="pt-BR" sz="5420"/>
-              <a:t>docker compose?</a:t>
+              <a:t>Docker Compose?</a:t>
             </a:r>
             <a:endParaRPr sz="5420"/>
           </a:p>
@@ -18473,12 +19521,12 @@
 </p:sld>
 </file>
 
-<file path=ppt/slides/slide39.xml><?xml version="1.0" encoding="utf-8"?>
+<file path=ppt/slides/slide42.xml><?xml version="1.0" encoding="utf-8"?>
 <p:sld xmlns:a="http://schemas.openxmlformats.org/drawingml/2006/main" xmlns:r="http://schemas.openxmlformats.org/officeDocument/2006/relationships" xmlns:mc="http://schemas.openxmlformats.org/markup-compatibility/2006" xmlns:mv="urn:schemas-microsoft-com:mac:vml" xmlns:p="http://schemas.openxmlformats.org/presentationml/2006/main" xmlns:c="http://schemas.openxmlformats.org/drawingml/2006/chart" xmlns:dgm="http://schemas.openxmlformats.org/drawingml/2006/diagram" xmlns:o="urn:schemas-microsoft-com:office:office" xmlns:v="urn:schemas-microsoft-com:vml" xmlns:pvml="urn:schemas-microsoft-com:office:powerpoint" xmlns:com="http://schemas.openxmlformats.org/drawingml/2006/compatibility" xmlns:p14="http://schemas.microsoft.com/office/powerpoint/2010/main" xmlns:p15="http://schemas.microsoft.com/office/powerpoint/2012/main" xmlns:ahyp="http://schemas.microsoft.com/office/drawing/2018/hyperlinkcolor">
   <p:cSld>
     <p:spTree>
       <p:nvGrpSpPr>
-        <p:cNvPr id="448" name="Shape 448"/>
+        <p:cNvPr id="476" name="Shape 476"/>
         <p:cNvGrpSpPr/>
         <p:nvPr/>
       </p:nvGrpSpPr>
@@ -18492,7 +19540,7 @@
       </p:grpSpPr>
       <p:sp>
         <p:nvSpPr>
-          <p:cNvPr id="449" name="Google Shape;449;p51"/>
+          <p:cNvPr id="477" name="Google Shape;477;p54"/>
           <p:cNvSpPr txBox="1"/>
           <p:nvPr>
             <p:ph type="title"/>
@@ -18508,7 +19556,7 @@
           </a:prstGeom>
         </p:spPr>
         <p:txBody>
-          <a:bodyPr anchorCtr="0" anchor="t" bIns="91425" lIns="91425" spcFirstLastPara="1" rIns="91425" wrap="square" tIns="91425">
+          <a:bodyPr anchorCtr="0" anchor="ctr" bIns="91425" lIns="91425" spcFirstLastPara="1" rIns="91425" wrap="square" tIns="91425">
             <a:noAutofit/>
           </a:bodyPr>
           <a:lstStyle/>
@@ -18533,7 +19581,7 @@
       </p:sp>
       <p:sp>
         <p:nvSpPr>
-          <p:cNvPr id="450" name="Google Shape;450;p51"/>
+          <p:cNvPr id="478" name="Google Shape;478;p54"/>
           <p:cNvSpPr txBox="1"/>
           <p:nvPr/>
         </p:nvSpPr>
@@ -18606,59 +19654,6 @@
 </p:sld>
 </file>
 
-<file path=ppt/slides/slide4.xml><?xml version="1.0" encoding="utf-8"?>
-<p:sld xmlns:a="http://schemas.openxmlformats.org/drawingml/2006/main" xmlns:r="http://schemas.openxmlformats.org/officeDocument/2006/relationships" xmlns:mc="http://schemas.openxmlformats.org/markup-compatibility/2006" xmlns:mv="urn:schemas-microsoft-com:mac:vml" xmlns:p="http://schemas.openxmlformats.org/presentationml/2006/main" xmlns:c="http://schemas.openxmlformats.org/drawingml/2006/chart" xmlns:dgm="http://schemas.openxmlformats.org/drawingml/2006/diagram" xmlns:o="urn:schemas-microsoft-com:office:office" xmlns:v="urn:schemas-microsoft-com:vml" xmlns:pvml="urn:schemas-microsoft-com:office:powerpoint" xmlns:com="http://schemas.openxmlformats.org/drawingml/2006/compatibility" xmlns:p14="http://schemas.microsoft.com/office/powerpoint/2010/main" xmlns:p15="http://schemas.microsoft.com/office/powerpoint/2012/main" xmlns:ahyp="http://schemas.microsoft.com/office/drawing/2018/hyperlinkcolor">
-  <p:cSld>
-    <p:spTree>
-      <p:nvGrpSpPr>
-        <p:cNvPr id="150" name="Shape 150"/>
-        <p:cNvGrpSpPr/>
-        <p:nvPr/>
-      </p:nvGrpSpPr>
-      <p:grpSpPr>
-        <a:xfrm>
-          <a:off x="0" y="0"/>
-          <a:ext cx="0" cy="0"/>
-          <a:chOff x="0" y="0"/>
-          <a:chExt cx="0" cy="0"/>
-        </a:xfrm>
-      </p:grpSpPr>
-      <p:pic>
-        <p:nvPicPr>
-          <p:cNvPr id="151" name="Google Shape;151;p16" title="image-1.png"/>
-          <p:cNvPicPr preferRelativeResize="0"/>
-          <p:nvPr/>
-        </p:nvPicPr>
-        <p:blipFill>
-          <a:blip r:embed="rId3">
-            <a:alphaModFix/>
-          </a:blip>
-          <a:stretch>
-            <a:fillRect/>
-          </a:stretch>
-        </p:blipFill>
-        <p:spPr>
-          <a:xfrm>
-            <a:off x="2216875" y="216625"/>
-            <a:ext cx="4710250" cy="4710250"/>
-          </a:xfrm>
-          <a:prstGeom prst="rect">
-            <a:avLst/>
-          </a:prstGeom>
-          <a:noFill/>
-          <a:ln>
-            <a:noFill/>
-          </a:ln>
-        </p:spPr>
-      </p:pic>
-    </p:spTree>
-  </p:cSld>
-  <p:clrMapOvr>
-    <a:masterClrMapping/>
-  </p:clrMapOvr>
-</p:sld>
-</file>
-
 <file path=ppt/slides/slide5.xml><?xml version="1.0" encoding="utf-8"?>
 <p:sld xmlns:a="http://schemas.openxmlformats.org/drawingml/2006/main" xmlns:r="http://schemas.openxmlformats.org/officeDocument/2006/relationships" xmlns:mc="http://schemas.openxmlformats.org/markup-compatibility/2006" xmlns:mv="urn:schemas-microsoft-com:mac:vml" xmlns:p="http://schemas.openxmlformats.org/presentationml/2006/main" xmlns:c="http://schemas.openxmlformats.org/drawingml/2006/chart" xmlns:dgm="http://schemas.openxmlformats.org/drawingml/2006/diagram" xmlns:o="urn:schemas-microsoft-com:office:office" xmlns:v="urn:schemas-microsoft-com:vml" xmlns:pvml="urn:schemas-microsoft-com:office:powerpoint" xmlns:com="http://schemas.openxmlformats.org/drawingml/2006/compatibility" xmlns:p14="http://schemas.microsoft.com/office/powerpoint/2010/main" xmlns:p15="http://schemas.microsoft.com/office/powerpoint/2012/main" xmlns:ahyp="http://schemas.microsoft.com/office/drawing/2018/hyperlinkcolor">
   <p:cSld>
@@ -20173,6 +21168,285 @@
 </file>
 
 <file path=ppt/theme/theme1.xml><?xml version="1.0" encoding="utf-8"?>
+<a:theme xmlns:a="http://schemas.openxmlformats.org/drawingml/2006/main" xmlns:r="http://schemas.openxmlformats.org/officeDocument/2006/relationships" name="Focus">
+  <a:themeElements>
+    <a:clrScheme name="Focus">
+      <a:dk1>
+        <a:srgbClr val="1B212C"/>
+      </a:dk1>
+      <a:lt1>
+        <a:srgbClr val="FFFFFF"/>
+      </a:lt1>
+      <a:dk2>
+        <a:srgbClr val="D9D9D9"/>
+      </a:dk2>
+      <a:lt2>
+        <a:srgbClr val="82C7A5"/>
+      </a:lt2>
+      <a:accent1>
+        <a:srgbClr val="0145AC"/>
+      </a:accent1>
+      <a:accent2>
+        <a:srgbClr val="EECE1A"/>
+      </a:accent2>
+      <a:accent3>
+        <a:srgbClr val="4E5567"/>
+      </a:accent3>
+      <a:accent4>
+        <a:srgbClr val="F4D6AD"/>
+      </a:accent4>
+      <a:accent5>
+        <a:srgbClr val="7890CD"/>
+      </a:accent5>
+      <a:accent6>
+        <a:srgbClr val="F15E22"/>
+      </a:accent6>
+      <a:hlink>
+        <a:srgbClr val="7890CD"/>
+      </a:hlink>
+      <a:folHlink>
+        <a:srgbClr val="7890CD"/>
+      </a:folHlink>
+    </a:clrScheme>
+    <a:fontScheme name="Office">
+      <a:majorFont>
+        <a:latin typeface="Arial"/>
+        <a:ea typeface=""/>
+        <a:cs typeface=""/>
+        <a:font script="Jpan" typeface="ＭＳ Ｐゴシック"/>
+        <a:font script="Hang" typeface="맑은 고딕"/>
+        <a:font script="Hans" typeface="宋体"/>
+        <a:font script="Hant" typeface="新細明體"/>
+        <a:font script="Arab" typeface="Times New Roman"/>
+        <a:font script="Hebr" typeface="Times New Roman"/>
+        <a:font script="Thai" typeface="Angsana New"/>
+        <a:font script="Ethi" typeface="Nyala"/>
+        <a:font script="Beng" typeface="Vrinda"/>
+        <a:font script="Gujr" typeface="Shruti"/>
+        <a:font script="Khmr" typeface="MoolBoran"/>
+        <a:font script="Knda" typeface="Tunga"/>
+        <a:font script="Guru" typeface="Raavi"/>
+        <a:font script="Cans" typeface="Euphemia"/>
+        <a:font script="Cher" typeface="Plantagenet Cherokee"/>
+        <a:font script="Yiii" typeface="Microsoft Yi Baiti"/>
+        <a:font script="Tibt" typeface="Microsoft Himalaya"/>
+        <a:font script="Thaa" typeface="MV Boli"/>
+        <a:font script="Deva" typeface="Mangal"/>
+        <a:font script="Telu" typeface="Gautami"/>
+        <a:font script="Taml" typeface="Latha"/>
+        <a:font script="Syrc" typeface="Estrangelo Edessa"/>
+        <a:font script="Orya" typeface="Kalinga"/>
+        <a:font script="Mlym" typeface="Kartika"/>
+        <a:font script="Laoo" typeface="DokChampa"/>
+        <a:font script="Sinh" typeface="Iskoola Pota"/>
+        <a:font script="Mong" typeface="Mongolian Baiti"/>
+        <a:font script="Viet" typeface="Times New Roman"/>
+        <a:font script="Uigh" typeface="Microsoft Uighur"/>
+        <a:font script="Geor" typeface="Sylfaen"/>
+      </a:majorFont>
+      <a:minorFont>
+        <a:latin typeface="Arial"/>
+        <a:ea typeface=""/>
+        <a:cs typeface=""/>
+        <a:font script="Jpan" typeface="ＭＳ Ｐゴシック"/>
+        <a:font script="Hang" typeface="맑은 고딕"/>
+        <a:font script="Hans" typeface="宋体"/>
+        <a:font script="Hant" typeface="新細明體"/>
+        <a:font script="Arab" typeface="Arial"/>
+        <a:font script="Hebr" typeface="Arial"/>
+        <a:font script="Thai" typeface="Cordia New"/>
+        <a:font script="Ethi" typeface="Nyala"/>
+        <a:font script="Beng" typeface="Vrinda"/>
+        <a:font script="Gujr" typeface="Shruti"/>
+        <a:font script="Khmr" typeface="DaunPenh"/>
+        <a:font script="Knda" typeface="Tunga"/>
+        <a:font script="Guru" typeface="Raavi"/>
+        <a:font script="Cans" typeface="Euphemia"/>
+        <a:font script="Cher" typeface="Plantagenet Cherokee"/>
+        <a:font script="Yiii" typeface="Microsoft Yi Baiti"/>
+        <a:font script="Tibt" typeface="Microsoft Himalaya"/>
+        <a:font script="Thaa" typeface="MV Boli"/>
+        <a:font script="Deva" typeface="Mangal"/>
+        <a:font script="Telu" typeface="Gautami"/>
+        <a:font script="Taml" typeface="Latha"/>
+        <a:font script="Syrc" typeface="Estrangelo Edessa"/>
+        <a:font script="Orya" typeface="Kalinga"/>
+        <a:font script="Mlym" typeface="Kartika"/>
+        <a:font script="Laoo" typeface="DokChampa"/>
+        <a:font script="Sinh" typeface="Iskoola Pota"/>
+        <a:font script="Mong" typeface="Mongolian Baiti"/>
+        <a:font script="Viet" typeface="Arial"/>
+        <a:font script="Uigh" typeface="Microsoft Uighur"/>
+        <a:font script="Geor" typeface="Sylfaen"/>
+      </a:minorFont>
+    </a:fontScheme>
+    <a:fmtScheme name="Office">
+      <a:fillStyleLst>
+        <a:solidFill>
+          <a:schemeClr val="phClr"/>
+        </a:solidFill>
+        <a:gradFill rotWithShape="1">
+          <a:gsLst>
+            <a:gs pos="0">
+              <a:schemeClr val="phClr">
+                <a:tint val="50000"/>
+                <a:satMod val="300000"/>
+              </a:schemeClr>
+            </a:gs>
+            <a:gs pos="35000">
+              <a:schemeClr val="phClr">
+                <a:tint val="37000"/>
+                <a:satMod val="300000"/>
+              </a:schemeClr>
+            </a:gs>
+            <a:gs pos="100000">
+              <a:schemeClr val="phClr">
+                <a:tint val="15000"/>
+                <a:satMod val="350000"/>
+              </a:schemeClr>
+            </a:gs>
+          </a:gsLst>
+          <a:lin ang="16200000" scaled="1"/>
+        </a:gradFill>
+        <a:gradFill rotWithShape="1">
+          <a:gsLst>
+            <a:gs pos="0">
+              <a:schemeClr val="phClr">
+                <a:tint val="100000"/>
+                <a:shade val="100000"/>
+                <a:satMod val="130000"/>
+              </a:schemeClr>
+            </a:gs>
+            <a:gs pos="100000">
+              <a:schemeClr val="phClr">
+                <a:tint val="50000"/>
+                <a:shade val="100000"/>
+                <a:satMod val="350000"/>
+              </a:schemeClr>
+            </a:gs>
+          </a:gsLst>
+          <a:lin ang="16200000" scaled="0"/>
+        </a:gradFill>
+      </a:fillStyleLst>
+      <a:lnStyleLst>
+        <a:ln w="9525" cap="flat" cmpd="sng" algn="ctr">
+          <a:solidFill>
+            <a:schemeClr val="phClr">
+              <a:shade val="95000"/>
+              <a:satMod val="105000"/>
+            </a:schemeClr>
+          </a:solidFill>
+          <a:prstDash val="solid"/>
+        </a:ln>
+        <a:ln w="25400" cap="flat" cmpd="sng" algn="ctr">
+          <a:solidFill>
+            <a:schemeClr val="phClr"/>
+          </a:solidFill>
+          <a:prstDash val="solid"/>
+        </a:ln>
+        <a:ln w="38100" cap="flat" cmpd="sng" algn="ctr">
+          <a:solidFill>
+            <a:schemeClr val="phClr"/>
+          </a:solidFill>
+          <a:prstDash val="solid"/>
+        </a:ln>
+      </a:lnStyleLst>
+      <a:effectStyleLst>
+        <a:effectStyle>
+          <a:effectLst>
+            <a:outerShdw blurRad="40000" dist="20000" dir="5400000" rotWithShape="0">
+              <a:srgbClr val="000000">
+                <a:alpha val="38000"/>
+              </a:srgbClr>
+            </a:outerShdw>
+          </a:effectLst>
+        </a:effectStyle>
+        <a:effectStyle>
+          <a:effectLst>
+            <a:outerShdw blurRad="40000" dist="23000" dir="5400000" rotWithShape="0">
+              <a:srgbClr val="000000">
+                <a:alpha val="35000"/>
+              </a:srgbClr>
+            </a:outerShdw>
+          </a:effectLst>
+        </a:effectStyle>
+        <a:effectStyle>
+          <a:effectLst>
+            <a:outerShdw blurRad="40000" dist="23000" dir="5400000" rotWithShape="0">
+              <a:srgbClr val="000000">
+                <a:alpha val="35000"/>
+              </a:srgbClr>
+            </a:outerShdw>
+          </a:effectLst>
+          <a:scene3d>
+            <a:camera prst="orthographicFront">
+              <a:rot lat="0" lon="0" rev="0"/>
+            </a:camera>
+            <a:lightRig rig="threePt" dir="t">
+              <a:rot lat="0" lon="0" rev="1200000"/>
+            </a:lightRig>
+          </a:scene3d>
+          <a:sp3d>
+            <a:bevelT w="63500" h="25400"/>
+          </a:sp3d>
+        </a:effectStyle>
+      </a:effectStyleLst>
+      <a:bgFillStyleLst>
+        <a:solidFill>
+          <a:schemeClr val="phClr"/>
+        </a:solidFill>
+        <a:gradFill rotWithShape="1">
+          <a:gsLst>
+            <a:gs pos="0">
+              <a:schemeClr val="phClr">
+                <a:tint val="40000"/>
+                <a:satMod val="350000"/>
+              </a:schemeClr>
+            </a:gs>
+            <a:gs pos="40000">
+              <a:schemeClr val="phClr">
+                <a:tint val="45000"/>
+                <a:shade val="99000"/>
+                <a:satMod val="350000"/>
+              </a:schemeClr>
+            </a:gs>
+            <a:gs pos="100000">
+              <a:schemeClr val="phClr">
+                <a:shade val="20000"/>
+                <a:satMod val="255000"/>
+              </a:schemeClr>
+            </a:gs>
+          </a:gsLst>
+          <a:path path="circle">
+            <a:fillToRect l="50000" t="-80000" r="50000" b="180000"/>
+          </a:path>
+        </a:gradFill>
+        <a:gradFill rotWithShape="1">
+          <a:gsLst>
+            <a:gs pos="0">
+              <a:schemeClr val="phClr">
+                <a:tint val="80000"/>
+                <a:satMod val="300000"/>
+              </a:schemeClr>
+            </a:gs>
+            <a:gs pos="100000">
+              <a:schemeClr val="phClr">
+                <a:shade val="30000"/>
+                <a:satMod val="200000"/>
+              </a:schemeClr>
+            </a:gs>
+          </a:gsLst>
+          <a:path path="circle">
+            <a:fillToRect l="50000" t="50000" r="50000" b="50000"/>
+          </a:path>
+        </a:gradFill>
+      </a:bgFillStyleLst>
+    </a:fmtScheme>
+  </a:themeElements>
+</a:theme>
+</file>
+
+<file path=ppt/theme/theme2.xml><?xml version="1.0" encoding="utf-8"?>
 <a:theme xmlns:a="http://schemas.openxmlformats.org/drawingml/2006/main" xmlns:r="http://schemas.openxmlformats.org/officeDocument/2006/relationships">
   <a:themeElements>
     <a:clrScheme name="Default">
@@ -20449,283 +21723,4 @@
     </a:fmtScheme>
   </a:themeElements>
 </a:theme>
-</file>
-
-<file path=ppt/theme/theme2.xml><?xml version="1.0" encoding="utf-8"?>
-<a:theme xmlns:a="http://schemas.openxmlformats.org/drawingml/2006/main" xmlns:r="http://schemas.openxmlformats.org/officeDocument/2006/relationships" name="Focus">
-  <a:themeElements>
-    <a:clrScheme name="Focus">
-      <a:dk1>
-        <a:srgbClr val="1B212C"/>
-      </a:dk1>
-      <a:lt1>
-        <a:srgbClr val="FFFFFF"/>
-      </a:lt1>
-      <a:dk2>
-        <a:srgbClr val="D9D9D9"/>
-      </a:dk2>
-      <a:lt2>
-        <a:srgbClr val="82C7A5"/>
-      </a:lt2>
-      <a:accent1>
-        <a:srgbClr val="0145AC"/>
-      </a:accent1>
-      <a:accent2>
-        <a:srgbClr val="EECE1A"/>
-      </a:accent2>
-      <a:accent3>
-        <a:srgbClr val="4E5567"/>
-      </a:accent3>
-      <a:accent4>
-        <a:srgbClr val="F4D6AD"/>
-      </a:accent4>
-      <a:accent5>
-        <a:srgbClr val="7890CD"/>
-      </a:accent5>
-      <a:accent6>
-        <a:srgbClr val="F15E22"/>
-      </a:accent6>
-      <a:hlink>
-        <a:srgbClr val="7890CD"/>
-      </a:hlink>
-      <a:folHlink>
-        <a:srgbClr val="7890CD"/>
-      </a:folHlink>
-    </a:clrScheme>
-    <a:fontScheme name="Office">
-      <a:majorFont>
-        <a:latin typeface="Arial"/>
-        <a:ea typeface=""/>
-        <a:cs typeface=""/>
-        <a:font script="Jpan" typeface="ＭＳ Ｐゴシック"/>
-        <a:font script="Hang" typeface="맑은 고딕"/>
-        <a:font script="Hans" typeface="宋体"/>
-        <a:font script="Hant" typeface="新細明體"/>
-        <a:font script="Arab" typeface="Times New Roman"/>
-        <a:font script="Hebr" typeface="Times New Roman"/>
-        <a:font script="Thai" typeface="Angsana New"/>
-        <a:font script="Ethi" typeface="Nyala"/>
-        <a:font script="Beng" typeface="Vrinda"/>
-        <a:font script="Gujr" typeface="Shruti"/>
-        <a:font script="Khmr" typeface="MoolBoran"/>
-        <a:font script="Knda" typeface="Tunga"/>
-        <a:font script="Guru" typeface="Raavi"/>
-        <a:font script="Cans" typeface="Euphemia"/>
-        <a:font script="Cher" typeface="Plantagenet Cherokee"/>
-        <a:font script="Yiii" typeface="Microsoft Yi Baiti"/>
-        <a:font script="Tibt" typeface="Microsoft Himalaya"/>
-        <a:font script="Thaa" typeface="MV Boli"/>
-        <a:font script="Deva" typeface="Mangal"/>
-        <a:font script="Telu" typeface="Gautami"/>
-        <a:font script="Taml" typeface="Latha"/>
-        <a:font script="Syrc" typeface="Estrangelo Edessa"/>
-        <a:font script="Orya" typeface="Kalinga"/>
-        <a:font script="Mlym" typeface="Kartika"/>
-        <a:font script="Laoo" typeface="DokChampa"/>
-        <a:font script="Sinh" typeface="Iskoola Pota"/>
-        <a:font script="Mong" typeface="Mongolian Baiti"/>
-        <a:font script="Viet" typeface="Times New Roman"/>
-        <a:font script="Uigh" typeface="Microsoft Uighur"/>
-        <a:font script="Geor" typeface="Sylfaen"/>
-      </a:majorFont>
-      <a:minorFont>
-        <a:latin typeface="Arial"/>
-        <a:ea typeface=""/>
-        <a:cs typeface=""/>
-        <a:font script="Jpan" typeface="ＭＳ Ｐゴシック"/>
-        <a:font script="Hang" typeface="맑은 고딕"/>
-        <a:font script="Hans" typeface="宋体"/>
-        <a:font script="Hant" typeface="新細明體"/>
-        <a:font script="Arab" typeface="Arial"/>
-        <a:font script="Hebr" typeface="Arial"/>
-        <a:font script="Thai" typeface="Cordia New"/>
-        <a:font script="Ethi" typeface="Nyala"/>
-        <a:font script="Beng" typeface="Vrinda"/>
-        <a:font script="Gujr" typeface="Shruti"/>
-        <a:font script="Khmr" typeface="DaunPenh"/>
-        <a:font script="Knda" typeface="Tunga"/>
-        <a:font script="Guru" typeface="Raavi"/>
-        <a:font script="Cans" typeface="Euphemia"/>
-        <a:font script="Cher" typeface="Plantagenet Cherokee"/>
-        <a:font script="Yiii" typeface="Microsoft Yi Baiti"/>
-        <a:font script="Tibt" typeface="Microsoft Himalaya"/>
-        <a:font script="Thaa" typeface="MV Boli"/>
-        <a:font script="Deva" typeface="Mangal"/>
-        <a:font script="Telu" typeface="Gautami"/>
-        <a:font script="Taml" typeface="Latha"/>
-        <a:font script="Syrc" typeface="Estrangelo Edessa"/>
-        <a:font script="Orya" typeface="Kalinga"/>
-        <a:font script="Mlym" typeface="Kartika"/>
-        <a:font script="Laoo" typeface="DokChampa"/>
-        <a:font script="Sinh" typeface="Iskoola Pota"/>
-        <a:font script="Mong" typeface="Mongolian Baiti"/>
-        <a:font script="Viet" typeface="Arial"/>
-        <a:font script="Uigh" typeface="Microsoft Uighur"/>
-        <a:font script="Geor" typeface="Sylfaen"/>
-      </a:minorFont>
-    </a:fontScheme>
-    <a:fmtScheme name="Office">
-      <a:fillStyleLst>
-        <a:solidFill>
-          <a:schemeClr val="phClr"/>
-        </a:solidFill>
-        <a:gradFill rotWithShape="1">
-          <a:gsLst>
-            <a:gs pos="0">
-              <a:schemeClr val="phClr">
-                <a:tint val="50000"/>
-                <a:satMod val="300000"/>
-              </a:schemeClr>
-            </a:gs>
-            <a:gs pos="35000">
-              <a:schemeClr val="phClr">
-                <a:tint val="37000"/>
-                <a:satMod val="300000"/>
-              </a:schemeClr>
-            </a:gs>
-            <a:gs pos="100000">
-              <a:schemeClr val="phClr">
-                <a:tint val="15000"/>
-                <a:satMod val="350000"/>
-              </a:schemeClr>
-            </a:gs>
-          </a:gsLst>
-          <a:lin ang="16200000" scaled="1"/>
-        </a:gradFill>
-        <a:gradFill rotWithShape="1">
-          <a:gsLst>
-            <a:gs pos="0">
-              <a:schemeClr val="phClr">
-                <a:tint val="100000"/>
-                <a:shade val="100000"/>
-                <a:satMod val="130000"/>
-              </a:schemeClr>
-            </a:gs>
-            <a:gs pos="100000">
-              <a:schemeClr val="phClr">
-                <a:tint val="50000"/>
-                <a:shade val="100000"/>
-                <a:satMod val="350000"/>
-              </a:schemeClr>
-            </a:gs>
-          </a:gsLst>
-          <a:lin ang="16200000" scaled="0"/>
-        </a:gradFill>
-      </a:fillStyleLst>
-      <a:lnStyleLst>
-        <a:ln w="9525" cap="flat" cmpd="sng" algn="ctr">
-          <a:solidFill>
-            <a:schemeClr val="phClr">
-              <a:shade val="95000"/>
-              <a:satMod val="105000"/>
-            </a:schemeClr>
-          </a:solidFill>
-          <a:prstDash val="solid"/>
-        </a:ln>
-        <a:ln w="25400" cap="flat" cmpd="sng" algn="ctr">
-          <a:solidFill>
-            <a:schemeClr val="phClr"/>
-          </a:solidFill>
-          <a:prstDash val="solid"/>
-        </a:ln>
-        <a:ln w="38100" cap="flat" cmpd="sng" algn="ctr">
-          <a:solidFill>
-            <a:schemeClr val="phClr"/>
-          </a:solidFill>
-          <a:prstDash val="solid"/>
-        </a:ln>
-      </a:lnStyleLst>
-      <a:effectStyleLst>
-        <a:effectStyle>
-          <a:effectLst>
-            <a:outerShdw blurRad="40000" dist="20000" dir="5400000" rotWithShape="0">
-              <a:srgbClr val="000000">
-                <a:alpha val="38000"/>
-              </a:srgbClr>
-            </a:outerShdw>
-          </a:effectLst>
-        </a:effectStyle>
-        <a:effectStyle>
-          <a:effectLst>
-            <a:outerShdw blurRad="40000" dist="23000" dir="5400000" rotWithShape="0">
-              <a:srgbClr val="000000">
-                <a:alpha val="35000"/>
-              </a:srgbClr>
-            </a:outerShdw>
-          </a:effectLst>
-        </a:effectStyle>
-        <a:effectStyle>
-          <a:effectLst>
-            <a:outerShdw blurRad="40000" dist="23000" dir="5400000" rotWithShape="0">
-              <a:srgbClr val="000000">
-                <a:alpha val="35000"/>
-              </a:srgbClr>
-            </a:outerShdw>
-          </a:effectLst>
-          <a:scene3d>
-            <a:camera prst="orthographicFront">
-              <a:rot lat="0" lon="0" rev="0"/>
-            </a:camera>
-            <a:lightRig rig="threePt" dir="t">
-              <a:rot lat="0" lon="0" rev="1200000"/>
-            </a:lightRig>
-          </a:scene3d>
-          <a:sp3d>
-            <a:bevelT w="63500" h="25400"/>
-          </a:sp3d>
-        </a:effectStyle>
-      </a:effectStyleLst>
-      <a:bgFillStyleLst>
-        <a:solidFill>
-          <a:schemeClr val="phClr"/>
-        </a:solidFill>
-        <a:gradFill rotWithShape="1">
-          <a:gsLst>
-            <a:gs pos="0">
-              <a:schemeClr val="phClr">
-                <a:tint val="40000"/>
-                <a:satMod val="350000"/>
-              </a:schemeClr>
-            </a:gs>
-            <a:gs pos="40000">
-              <a:schemeClr val="phClr">
-                <a:tint val="45000"/>
-                <a:shade val="99000"/>
-                <a:satMod val="350000"/>
-              </a:schemeClr>
-            </a:gs>
-            <a:gs pos="100000">
-              <a:schemeClr val="phClr">
-                <a:shade val="20000"/>
-                <a:satMod val="255000"/>
-              </a:schemeClr>
-            </a:gs>
-          </a:gsLst>
-          <a:path path="circle">
-            <a:fillToRect l="50000" t="-80000" r="50000" b="180000"/>
-          </a:path>
-        </a:gradFill>
-        <a:gradFill rotWithShape="1">
-          <a:gsLst>
-            <a:gs pos="0">
-              <a:schemeClr val="phClr">
-                <a:tint val="80000"/>
-                <a:satMod val="300000"/>
-              </a:schemeClr>
-            </a:gs>
-            <a:gs pos="100000">
-              <a:schemeClr val="phClr">
-                <a:shade val="30000"/>
-                <a:satMod val="200000"/>
-              </a:schemeClr>
-            </a:gs>
-          </a:gsLst>
-          <a:path path="circle">
-            <a:fillToRect l="50000" t="50000" r="50000" b="50000"/>
-          </a:path>
-        </a:gradFill>
-      </a:bgFillStyleLst>
-    </a:fmtScheme>
-  </a:themeElements>
-</a:theme>
 </file>
</xml_diff>